<commit_message>
deletion of useless slides and grammar corrections
</commit_message>
<xml_diff>
--- a/CapStoneProject.pptx
+++ b/CapStoneProject.pptx
@@ -16,11 +16,6 @@
     <p:sldId id="274" r:id="rId10"/>
     <p:sldId id="258" r:id="rId11"/>
     <p:sldId id="262" r:id="rId12"/>
-    <p:sldId id="259" r:id="rId13"/>
-    <p:sldId id="275" r:id="rId14"/>
-    <p:sldId id="265" r:id="rId15"/>
-    <p:sldId id="260" r:id="rId16"/>
-    <p:sldId id="261" r:id="rId17"/>
   </p:sldIdLst>
   <p:sldSz cx="12192000" cy="6858000"/>
   <p:notesSz cx="6858000" cy="9144000"/>
@@ -894,7 +889,11 @@
     </dgm:pt>
     <dgm:pt modelId="{7EBAC061-918C-45BA-9B7E-6B1B13274F90}">
       <dgm:prSet phldrT="[Texte]"/>
-      <dgm:spPr/>
+      <dgm:spPr>
+        <a:solidFill>
+          <a:srgbClr val="3A558A"/>
+        </a:solidFill>
+      </dgm:spPr>
       <dgm:t>
         <a:bodyPr anchor="ctr"/>
         <a:lstStyle/>
@@ -931,7 +930,11 @@
     </dgm:pt>
     <dgm:pt modelId="{55DFD595-DF2D-41A3-8100-D69026F6B462}">
       <dgm:prSet phldrT="[Texte]"/>
-      <dgm:spPr/>
+      <dgm:spPr>
+        <a:solidFill>
+          <a:srgbClr val="3A558A"/>
+        </a:solidFill>
+      </dgm:spPr>
       <dgm:t>
         <a:bodyPr anchor="ctr"/>
         <a:lstStyle/>
@@ -972,7 +975,11 @@
     </dgm:pt>
     <dgm:pt modelId="{A3F7696C-8E8A-4F4B-94E4-751DCBD902CE}">
       <dgm:prSet phldrT="[Texte]"/>
-      <dgm:spPr/>
+      <dgm:spPr>
+        <a:solidFill>
+          <a:srgbClr val="3A558A"/>
+        </a:solidFill>
+      </dgm:spPr>
       <dgm:t>
         <a:bodyPr anchor="ctr"/>
         <a:lstStyle/>
@@ -1009,7 +1016,11 @@
     </dgm:pt>
     <dgm:pt modelId="{DDA1B1D6-66F6-4604-BE1D-15822DB27C77}">
       <dgm:prSet phldrT="[Texte]"/>
-      <dgm:spPr/>
+      <dgm:spPr>
+        <a:solidFill>
+          <a:srgbClr val="3A558A"/>
+        </a:solidFill>
+      </dgm:spPr>
       <dgm:t>
         <a:bodyPr anchor="ctr"/>
         <a:lstStyle/>
@@ -1046,7 +1057,11 @@
     </dgm:pt>
     <dgm:pt modelId="{CCE4A7D9-53D1-4C1D-84BC-FA8A44F3316B}">
       <dgm:prSet phldrT="[Texte]"/>
-      <dgm:spPr/>
+      <dgm:spPr>
+        <a:solidFill>
+          <a:srgbClr val="3A558A"/>
+        </a:solidFill>
+      </dgm:spPr>
       <dgm:t>
         <a:bodyPr anchor="ctr"/>
         <a:lstStyle/>
@@ -1083,7 +1098,11 @@
     </dgm:pt>
     <dgm:pt modelId="{342DA52E-E571-45D6-87A9-40F2DBE43BD8}">
       <dgm:prSet phldrT="[Texte]"/>
-      <dgm:spPr/>
+      <dgm:spPr>
+        <a:solidFill>
+          <a:srgbClr val="3A558A"/>
+        </a:solidFill>
+      </dgm:spPr>
       <dgm:t>
         <a:bodyPr anchor="ctr"/>
         <a:lstStyle/>
@@ -1120,7 +1139,11 @@
     </dgm:pt>
     <dgm:pt modelId="{EC7159C6-8498-4D65-A7EF-4D1AABC747AA}">
       <dgm:prSet phldrT="[Texte]"/>
-      <dgm:spPr/>
+      <dgm:spPr>
+        <a:solidFill>
+          <a:srgbClr val="3A558A"/>
+        </a:solidFill>
+      </dgm:spPr>
       <dgm:t>
         <a:bodyPr anchor="ctr"/>
         <a:lstStyle/>
@@ -1161,7 +1184,11 @@
     </dgm:pt>
     <dgm:pt modelId="{AADC7CDF-A10B-425A-82E9-92A34D8645EF}">
       <dgm:prSet phldrT="[Texte]"/>
-      <dgm:spPr/>
+      <dgm:spPr>
+        <a:solidFill>
+          <a:srgbClr val="3A558A"/>
+        </a:solidFill>
+      </dgm:spPr>
       <dgm:t>
         <a:bodyPr anchor="ctr"/>
         <a:lstStyle/>
@@ -1198,7 +1225,11 @@
     </dgm:pt>
     <dgm:pt modelId="{0FE63817-614A-40FC-ABA0-45FDF94AB240}">
       <dgm:prSet phldrT="[Texte]"/>
-      <dgm:spPr/>
+      <dgm:spPr>
+        <a:solidFill>
+          <a:srgbClr val="3A558A"/>
+        </a:solidFill>
+      </dgm:spPr>
       <dgm:t>
         <a:bodyPr anchor="ctr"/>
         <a:lstStyle/>
@@ -1239,7 +1270,11 @@
     </dgm:pt>
     <dgm:pt modelId="{3EBD6149-7FA9-42C5-967B-BFA5587D3FD2}">
       <dgm:prSet phldrT="[Texte]"/>
-      <dgm:spPr/>
+      <dgm:spPr>
+        <a:solidFill>
+          <a:srgbClr val="3A558A"/>
+        </a:solidFill>
+      </dgm:spPr>
       <dgm:t>
         <a:bodyPr anchor="ctr"/>
         <a:lstStyle/>
@@ -1413,12 +1448,7 @@
           </a:avLst>
         </a:prstGeom>
         <a:solidFill>
-          <a:schemeClr val="dk2">
-            <a:hueOff val="0"/>
-            <a:satOff val="0"/>
-            <a:lumOff val="0"/>
-            <a:alphaOff val="0"/>
-          </a:schemeClr>
+          <a:srgbClr val="3A558A"/>
         </a:solidFill>
         <a:ln w="12700" cap="flat" cmpd="sng" algn="ctr">
           <a:solidFill>
@@ -1603,12 +1633,7 @@
           </a:avLst>
         </a:prstGeom>
         <a:solidFill>
-          <a:schemeClr val="dk2">
-            <a:hueOff val="0"/>
-            <a:satOff val="0"/>
-            <a:lumOff val="0"/>
-            <a:alphaOff val="0"/>
-          </a:schemeClr>
+          <a:srgbClr val="3A558A"/>
         </a:solidFill>
         <a:ln w="12700" cap="flat" cmpd="sng" algn="ctr">
           <a:solidFill>
@@ -1771,12 +1796,7 @@
           </a:avLst>
         </a:prstGeom>
         <a:solidFill>
-          <a:schemeClr val="dk2">
-            <a:hueOff val="0"/>
-            <a:satOff val="0"/>
-            <a:lumOff val="0"/>
-            <a:alphaOff val="0"/>
-          </a:schemeClr>
+          <a:srgbClr val="3A558A"/>
         </a:solidFill>
         <a:ln w="12700" cap="flat" cmpd="sng" algn="ctr">
           <a:solidFill>
@@ -1961,12 +1981,7 @@
           </a:avLst>
         </a:prstGeom>
         <a:solidFill>
-          <a:schemeClr val="dk2">
-            <a:hueOff val="0"/>
-            <a:satOff val="0"/>
-            <a:lumOff val="0"/>
-            <a:alphaOff val="0"/>
-          </a:schemeClr>
+          <a:srgbClr val="3A558A"/>
         </a:solidFill>
         <a:ln w="12700" cap="flat" cmpd="sng" algn="ctr">
           <a:solidFill>
@@ -6662,7 +6677,7 @@
         <p:spPr>
           <a:xfrm>
             <a:off x="3045368" y="4074718"/>
-            <a:ext cx="6105194" cy="682079"/>
+            <a:ext cx="6105194" cy="1002608"/>
           </a:xfrm>
         </p:spPr>
         <p:txBody>
@@ -6713,7 +6728,17 @@
               </a:rPr>
               <a:t>IBM Data Science Certificat Professionnel</a:t>
             </a:r>
-            <a:endParaRPr lang="en-GB" dirty="0">
+          </a:p>
+          <a:p>
+            <a:r>
+              <a:rPr lang="fr-FR" sz="2100" dirty="0">
+                <a:solidFill>
+                  <a:schemeClr val="bg1"/>
+                </a:solidFill>
+              </a:rPr>
+              <a:t>Pierre Beylard 13/05/2020</a:t>
+            </a:r>
+            <a:endParaRPr lang="en-GB" sz="2100" dirty="0">
               <a:solidFill>
                 <a:schemeClr val="bg1"/>
               </a:solidFill>
@@ -7012,10 +7037,13 @@
         </p:spPr>
         <p:txBody>
           <a:bodyPr anchor="ctr">
-            <a:normAutofit lnSpcReduction="10000"/>
+            <a:normAutofit/>
           </a:bodyPr>
           <a:lstStyle/>
           <a:p>
+            <a:pPr marL="0" indent="0">
+              <a:buNone/>
+            </a:pPr>
             <a:r>
               <a:rPr lang="en-GB" sz="2400" dirty="0">
                 <a:solidFill>
@@ -7033,6 +7061,9 @@
             </a:endParaRPr>
           </a:p>
           <a:p>
+            <a:pPr marL="0" indent="0">
+              <a:buNone/>
+            </a:pPr>
             <a:r>
               <a:rPr lang="en-GB" sz="2400" dirty="0">
                 <a:solidFill>
@@ -7084,6 +7115,9 @@
             </a:endParaRPr>
           </a:p>
           <a:p>
+            <a:pPr marL="0" indent="0">
+              <a:buNone/>
+            </a:pPr>
             <a:r>
               <a:rPr lang="en-GB" sz="2400" dirty="0">
                 <a:solidFill>
@@ -7380,7 +7414,7 @@
 </p:sld>
 </file>
 
-<file path=ppt/slides/slide12.xml><?xml version="1.0" encoding="utf-8"?>
+<file path=ppt/slides/slide2.xml><?xml version="1.0" encoding="utf-8"?>
 <p:sld xmlns:a="http://schemas.openxmlformats.org/drawingml/2006/main" xmlns:r="http://schemas.openxmlformats.org/officeDocument/2006/relationships" xmlns:p="http://schemas.openxmlformats.org/presentationml/2006/main">
   <p:cSld>
     <p:bg>
@@ -7407,478 +7441,7 @@
       </p:grpSpPr>
       <p:sp>
         <p:nvSpPr>
-          <p:cNvPr id="8" name="Rectangle 7">
-            <a:extLst>
-              <a:ext uri="{FF2B5EF4-FFF2-40B4-BE49-F238E27FC236}">
-                <a16:creationId xmlns:a16="http://schemas.microsoft.com/office/drawing/2014/main" id="{D3FFFA32-D9F4-4AF9-A025-CD128AC85E32}"/>
-              </a:ext>
-              <a:ext uri="{C183D7F6-B498-43B3-948B-1728B52AA6E4}">
-                <adec:decorative xmlns:adec="http://schemas.microsoft.com/office/drawing/2017/decorative" val="1"/>
-              </a:ext>
-            </a:extLst>
-          </p:cNvPr>
-          <p:cNvSpPr>
-            <a:spLocks noGrp="1" noRot="1" noChangeAspect="1" noMove="1" noResize="1" noEditPoints="1" noAdjustHandles="1" noChangeArrowheads="1" noChangeShapeType="1" noTextEdit="1"/>
-          </p:cNvSpPr>
-          <p:nvPr>
-            <p:extLst>
-              <p:ext uri="{386F3935-93C4-4BCD-93E2-E3B085C9AB24}">
-                <p16:designElem xmlns:p16="http://schemas.microsoft.com/office/powerpoint/2015/main" val="1"/>
-              </p:ext>
-            </p:extLst>
-          </p:nvPr>
-        </p:nvSpPr>
-        <p:spPr>
-          <a:xfrm>
-            <a:off x="0" y="1360967"/>
-            <a:ext cx="12192000" cy="5497033"/>
-          </a:xfrm>
-          <a:prstGeom prst="rect">
-            <a:avLst/>
-          </a:prstGeom>
-          <a:gradFill>
-            <a:gsLst>
-              <a:gs pos="0">
-                <a:schemeClr val="accent1">
-                  <a:lumMod val="90000"/>
-                </a:schemeClr>
-              </a:gs>
-              <a:gs pos="25000">
-                <a:schemeClr val="accent1">
-                  <a:lumMod val="90000"/>
-                </a:schemeClr>
-              </a:gs>
-              <a:gs pos="94000">
-                <a:schemeClr val="bg2">
-                  <a:lumMod val="25000"/>
-                </a:schemeClr>
-              </a:gs>
-              <a:gs pos="100000">
-                <a:schemeClr val="bg2">
-                  <a:lumMod val="25000"/>
-                </a:schemeClr>
-              </a:gs>
-            </a:gsLst>
-            <a:lin ang="4200000" scaled="0"/>
-          </a:gradFill>
-          <a:ln>
-            <a:noFill/>
-          </a:ln>
-        </p:spPr>
-        <p:style>
-          <a:lnRef idx="2">
-            <a:schemeClr val="accent1">
-              <a:shade val="50000"/>
-            </a:schemeClr>
-          </a:lnRef>
-          <a:fillRef idx="1">
-            <a:schemeClr val="accent1"/>
-          </a:fillRef>
-          <a:effectRef idx="0">
-            <a:schemeClr val="accent1"/>
-          </a:effectRef>
-          <a:fontRef idx="minor">
-            <a:schemeClr val="lt1"/>
-          </a:fontRef>
-        </p:style>
-        <p:txBody>
-          <a:bodyPr rtlCol="0" anchor="ctr"/>
-          <a:lstStyle/>
-          <a:p>
-            <a:pPr algn="ctr"/>
-            <a:endParaRPr lang="en-US"/>
-          </a:p>
-        </p:txBody>
-      </p:sp>
-      <p:grpSp>
-        <p:nvGrpSpPr>
-          <p:cNvPr id="10" name="Group 9">
-            <a:extLst>
-              <a:ext uri="{FF2B5EF4-FFF2-40B4-BE49-F238E27FC236}">
-                <a16:creationId xmlns:a16="http://schemas.microsoft.com/office/drawing/2014/main" id="{2823A416-999C-4FA3-A853-0AE48404B5D7}"/>
-              </a:ext>
-              <a:ext uri="{C183D7F6-B498-43B3-948B-1728B52AA6E4}">
-                <adec:decorative xmlns:adec="http://schemas.microsoft.com/office/drawing/2017/decorative" val="1"/>
-              </a:ext>
-            </a:extLst>
-          </p:cNvPr>
-          <p:cNvGrpSpPr>
-            <a:grpSpLocks noGrp="1" noUngrp="1" noRot="1" noChangeAspect="1" noMove="1" noResize="1"/>
-          </p:cNvGrpSpPr>
-          <p:nvPr>
-            <p:extLst>
-              <p:ext uri="{386F3935-93C4-4BCD-93E2-E3B085C9AB24}">
-                <p16:designElem xmlns:p16="http://schemas.microsoft.com/office/powerpoint/2015/main" val="1"/>
-              </p:ext>
-            </p:extLst>
-          </p:nvPr>
-        </p:nvGrpSpPr>
-        <p:grpSpPr>
-          <a:xfrm flipV="1">
-            <a:off x="0" y="0"/>
-            <a:ext cx="12192000" cy="3049325"/>
-            <a:chOff x="0" y="3808676"/>
-            <a:chExt cx="12192000" cy="3049325"/>
-          </a:xfrm>
-        </p:grpSpPr>
-        <p:pic>
-          <p:nvPicPr>
-            <p:cNvPr id="11" name="Picture 10">
-              <a:extLst>
-                <a:ext uri="{FF2B5EF4-FFF2-40B4-BE49-F238E27FC236}">
-                  <a16:creationId xmlns:a16="http://schemas.microsoft.com/office/drawing/2014/main" id="{9362F656-1A8D-4BA3-BA72-92332E75DB99}"/>
-                </a:ext>
-                <a:ext uri="{C183D7F6-B498-43B3-948B-1728B52AA6E4}">
-                  <adec:decorative xmlns:adec="http://schemas.microsoft.com/office/drawing/2017/decorative" val="1"/>
-                </a:ext>
-              </a:extLst>
-            </p:cNvPr>
-            <p:cNvPicPr>
-              <a:picLocks noChangeAspect="1"/>
-            </p:cNvPicPr>
-            <p:nvPr>
-              <p:extLst>
-                <p:ext uri="{386F3935-93C4-4BCD-93E2-E3B085C9AB24}">
-                  <p16:designElem xmlns:p16="http://schemas.microsoft.com/office/powerpoint/2015/main" val="1"/>
-                </p:ext>
-              </p:extLst>
-            </p:nvPr>
-          </p:nvPicPr>
-          <p:blipFill>
-            <a:blip r:embed="rId2">
-              <a:extLst>
-                <a:ext uri="{28A0092B-C50C-407E-A947-70E740481C1C}">
-                  <a14:useLocalDpi xmlns:a14="http://schemas.microsoft.com/office/drawing/2010/main" val="0"/>
-                </a:ext>
-              </a:extLst>
-            </a:blip>
-            <a:srcRect t="45716" b="9820"/>
-            <a:stretch>
-              <a:fillRect/>
-            </a:stretch>
-          </p:blipFill>
-          <p:spPr>
-            <a:xfrm>
-              <a:off x="0" y="3808676"/>
-              <a:ext cx="12192000" cy="3049325"/>
-            </a:xfrm>
-            <a:custGeom>
-              <a:avLst/>
-              <a:gdLst>
-                <a:gd name="connsiteX0" fmla="*/ 0 w 12192000"/>
-                <a:gd name="connsiteY0" fmla="*/ 0 h 3049325"/>
-                <a:gd name="connsiteX1" fmla="*/ 12192000 w 12192000"/>
-                <a:gd name="connsiteY1" fmla="*/ 0 h 3049325"/>
-                <a:gd name="connsiteX2" fmla="*/ 12192000 w 12192000"/>
-                <a:gd name="connsiteY2" fmla="*/ 3049325 h 3049325"/>
-                <a:gd name="connsiteX3" fmla="*/ 0 w 12192000"/>
-                <a:gd name="connsiteY3" fmla="*/ 3049325 h 3049325"/>
-              </a:gdLst>
-              <a:ahLst/>
-              <a:cxnLst>
-                <a:cxn ang="0">
-                  <a:pos x="connsiteX0" y="connsiteY0"/>
-                </a:cxn>
-                <a:cxn ang="0">
-                  <a:pos x="connsiteX1" y="connsiteY1"/>
-                </a:cxn>
-                <a:cxn ang="0">
-                  <a:pos x="connsiteX2" y="connsiteY2"/>
-                </a:cxn>
-                <a:cxn ang="0">
-                  <a:pos x="connsiteX3" y="connsiteY3"/>
-                </a:cxn>
-              </a:cxnLst>
-              <a:rect l="l" t="t" r="r" b="b"/>
-              <a:pathLst>
-                <a:path w="12192000" h="3049325">
-                  <a:moveTo>
-                    <a:pt x="0" y="0"/>
-                  </a:moveTo>
-                  <a:lnTo>
-                    <a:pt x="12192000" y="0"/>
-                  </a:lnTo>
-                  <a:lnTo>
-                    <a:pt x="12192000" y="3049325"/>
-                  </a:lnTo>
-                  <a:lnTo>
-                    <a:pt x="0" y="3049325"/>
-                  </a:lnTo>
-                  <a:close/>
-                </a:path>
-              </a:pathLst>
-            </a:custGeom>
-          </p:spPr>
-        </p:pic>
-        <p:sp>
-          <p:nvSpPr>
-            <p:cNvPr id="12" name="Oval 11">
-              <a:extLst>
-                <a:ext uri="{FF2B5EF4-FFF2-40B4-BE49-F238E27FC236}">
-                  <a16:creationId xmlns:a16="http://schemas.microsoft.com/office/drawing/2014/main" id="{9338807D-FB66-4E3A-9CF0-786662C4AB40}"/>
-                </a:ext>
-                <a:ext uri="{C183D7F6-B498-43B3-948B-1728B52AA6E4}">
-                  <adec:decorative xmlns:adec="http://schemas.microsoft.com/office/drawing/2017/decorative" val="1"/>
-                </a:ext>
-              </a:extLst>
-            </p:cNvPr>
-            <p:cNvSpPr/>
-            <p:nvPr>
-              <p:extLst>
-                <p:ext uri="{386F3935-93C4-4BCD-93E2-E3B085C9AB24}">
-                  <p16:designElem xmlns:p16="http://schemas.microsoft.com/office/powerpoint/2015/main" val="1"/>
-                </p:ext>
-              </p:extLst>
-            </p:nvPr>
-          </p:nvSpPr>
-          <p:spPr>
-            <a:xfrm>
-              <a:off x="2067339" y="5375082"/>
-              <a:ext cx="373711" cy="405516"/>
-            </a:xfrm>
-            <a:prstGeom prst="ellipse">
-              <a:avLst/>
-            </a:prstGeom>
-            <a:solidFill>
-              <a:srgbClr val="FFFFFF"/>
-            </a:solidFill>
-            <a:ln>
-              <a:noFill/>
-            </a:ln>
-          </p:spPr>
-          <p:style>
-            <a:lnRef idx="2">
-              <a:schemeClr val="accent1">
-                <a:shade val="50000"/>
-              </a:schemeClr>
-            </a:lnRef>
-            <a:fillRef idx="1">
-              <a:schemeClr val="accent1"/>
-            </a:fillRef>
-            <a:effectRef idx="0">
-              <a:schemeClr val="accent1"/>
-            </a:effectRef>
-            <a:fontRef idx="minor">
-              <a:schemeClr val="lt1"/>
-            </a:fontRef>
-          </p:style>
-          <p:txBody>
-            <a:bodyPr rtlCol="0" anchor="ctr"/>
-            <a:lstStyle/>
-            <a:p>
-              <a:pPr algn="ctr"/>
-              <a:endParaRPr lang="en-US"/>
-            </a:p>
-          </p:txBody>
-        </p:sp>
-      </p:grpSp>
-      <p:sp>
-        <p:nvSpPr>
-          <p:cNvPr id="2" name="Titre 1">
-            <a:extLst>
-              <a:ext uri="{FF2B5EF4-FFF2-40B4-BE49-F238E27FC236}">
-                <a16:creationId xmlns:a16="http://schemas.microsoft.com/office/drawing/2014/main" id="{A6CB3A07-2033-4662-AFBE-32FF232A2C3B}"/>
-              </a:ext>
-            </a:extLst>
-          </p:cNvPr>
-          <p:cNvSpPr>
-            <a:spLocks noGrp="1"/>
-          </p:cNvSpPr>
-          <p:nvPr>
-            <p:ph type="title"/>
-          </p:nvPr>
-        </p:nvSpPr>
-        <p:spPr>
-          <a:xfrm>
-            <a:off x="1179226" y="448056"/>
-            <a:ext cx="9833548" cy="1066802"/>
-          </a:xfrm>
-        </p:spPr>
-        <p:txBody>
-          <a:bodyPr>
-            <a:normAutofit/>
-          </a:bodyPr>
-          <a:lstStyle/>
-          <a:p>
-            <a:r>
-              <a:rPr lang="en-GB" sz="4000" dirty="0" err="1">
-                <a:solidFill>
-                  <a:srgbClr val="3F3F3F"/>
-                </a:solidFill>
-              </a:rPr>
-              <a:t>Modeling</a:t>
-            </a:r>
-            <a:r>
-              <a:rPr lang="en-GB" sz="4000" dirty="0">
-                <a:solidFill>
-                  <a:srgbClr val="3F3F3F"/>
-                </a:solidFill>
-              </a:rPr>
-              <a:t> </a:t>
-            </a:r>
-          </a:p>
-        </p:txBody>
-      </p:sp>
-      <p:sp>
-        <p:nvSpPr>
-          <p:cNvPr id="3" name="Espace réservé du contenu 2">
-            <a:extLst>
-              <a:ext uri="{FF2B5EF4-FFF2-40B4-BE49-F238E27FC236}">
-                <a16:creationId xmlns:a16="http://schemas.microsoft.com/office/drawing/2014/main" id="{441538AB-E0C6-4377-9CE5-42CF4CDBCCBB}"/>
-              </a:ext>
-            </a:extLst>
-          </p:cNvPr>
-          <p:cNvSpPr>
-            <a:spLocks noGrp="1"/>
-          </p:cNvSpPr>
-          <p:nvPr>
-            <p:ph idx="1"/>
-          </p:nvPr>
-        </p:nvSpPr>
-        <p:spPr>
-          <a:xfrm>
-            <a:off x="1179226" y="3049325"/>
-            <a:ext cx="9833548" cy="2945574"/>
-          </a:xfrm>
-        </p:spPr>
-        <p:txBody>
-          <a:bodyPr anchor="ctr">
-            <a:normAutofit/>
-          </a:bodyPr>
-          <a:lstStyle/>
-          <a:p>
-            <a:endParaRPr lang="en-GB" sz="2400">
-              <a:solidFill>
-                <a:srgbClr val="FFFFFF"/>
-              </a:solidFill>
-            </a:endParaRPr>
-          </a:p>
-        </p:txBody>
-      </p:sp>
-    </p:spTree>
-    <p:extLst>
-      <p:ext uri="{BB962C8B-B14F-4D97-AF65-F5344CB8AC3E}">
-        <p14:creationId xmlns:p14="http://schemas.microsoft.com/office/powerpoint/2010/main" val="3635382599"/>
-      </p:ext>
-    </p:extLst>
-  </p:cSld>
-  <p:clrMapOvr>
-    <a:overrideClrMapping bg1="dk1" tx1="lt1" bg2="dk2" tx2="lt2" accent1="accent1" accent2="accent2" accent3="accent3" accent4="accent4" accent5="accent5" accent6="accent6" hlink="hlink" folHlink="folHlink"/>
-  </p:clrMapOvr>
-</p:sld>
-</file>
-
-<file path=ppt/slides/slide13.xml><?xml version="1.0" encoding="utf-8"?>
-<p:sld xmlns:a="http://schemas.openxmlformats.org/drawingml/2006/main" xmlns:r="http://schemas.openxmlformats.org/officeDocument/2006/relationships" xmlns:p="http://schemas.openxmlformats.org/presentationml/2006/main">
-  <p:cSld>
-    <p:spTree>
-      <p:nvGrpSpPr>
-        <p:cNvPr id="1" name=""/>
-        <p:cNvGrpSpPr/>
-        <p:nvPr/>
-      </p:nvGrpSpPr>
-      <p:grpSpPr>
-        <a:xfrm>
-          <a:off x="0" y="0"/>
-          <a:ext cx="0" cy="0"/>
-          <a:chOff x="0" y="0"/>
-          <a:chExt cx="0" cy="0"/>
-        </a:xfrm>
-      </p:grpSpPr>
-      <p:sp>
-        <p:nvSpPr>
-          <p:cNvPr id="2" name="Titre 1">
-            <a:extLst>
-              <a:ext uri="{FF2B5EF4-FFF2-40B4-BE49-F238E27FC236}">
-                <a16:creationId xmlns:a16="http://schemas.microsoft.com/office/drawing/2014/main" id="{9ADCBCD5-5ECB-48EA-BD94-2D2B82F9C3C1}"/>
-              </a:ext>
-            </a:extLst>
-          </p:cNvPr>
-          <p:cNvSpPr>
-            <a:spLocks noGrp="1"/>
-          </p:cNvSpPr>
-          <p:nvPr>
-            <p:ph type="title"/>
-          </p:nvPr>
-        </p:nvSpPr>
-        <p:spPr/>
-        <p:txBody>
-          <a:bodyPr/>
-          <a:lstStyle/>
-          <a:p>
-            <a:r>
-              <a:rPr lang="en-GB" dirty="0"/>
-              <a:t>Draft </a:t>
-            </a:r>
-          </a:p>
-        </p:txBody>
-      </p:sp>
-      <p:sp>
-        <p:nvSpPr>
-          <p:cNvPr id="3" name="Espace réservé du contenu 2">
-            <a:extLst>
-              <a:ext uri="{FF2B5EF4-FFF2-40B4-BE49-F238E27FC236}">
-                <a16:creationId xmlns:a16="http://schemas.microsoft.com/office/drawing/2014/main" id="{9EFA8BF2-6DC3-45AA-89DD-70348757E7A4}"/>
-              </a:ext>
-            </a:extLst>
-          </p:cNvPr>
-          <p:cNvSpPr>
-            <a:spLocks noGrp="1"/>
-          </p:cNvSpPr>
-          <p:nvPr>
-            <p:ph idx="1"/>
-          </p:nvPr>
-        </p:nvSpPr>
-        <p:spPr/>
-        <p:txBody>
-          <a:bodyPr/>
-          <a:lstStyle/>
-          <a:p>
-            <a:endParaRPr lang="en-GB"/>
-          </a:p>
-        </p:txBody>
-      </p:sp>
-    </p:spTree>
-    <p:extLst>
-      <p:ext uri="{BB962C8B-B14F-4D97-AF65-F5344CB8AC3E}">
-        <p14:creationId xmlns:p14="http://schemas.microsoft.com/office/powerpoint/2010/main" val="3864294180"/>
-      </p:ext>
-    </p:extLst>
-  </p:cSld>
-  <p:clrMapOvr>
-    <a:masterClrMapping/>
-  </p:clrMapOvr>
-</p:sld>
-</file>
-
-<file path=ppt/slides/slide14.xml><?xml version="1.0" encoding="utf-8"?>
-<p:sld xmlns:a="http://schemas.openxmlformats.org/drawingml/2006/main" xmlns:r="http://schemas.openxmlformats.org/officeDocument/2006/relationships" xmlns:p="http://schemas.openxmlformats.org/presentationml/2006/main">
-  <p:cSld>
-    <p:bg>
-      <p:bgPr>
-        <a:solidFill>
-          <a:schemeClr val="bg1"/>
-        </a:solidFill>
-        <a:effectLst/>
-      </p:bgPr>
-    </p:bg>
-    <p:spTree>
-      <p:nvGrpSpPr>
-        <p:cNvPr id="1" name=""/>
-        <p:cNvGrpSpPr/>
-        <p:nvPr/>
-      </p:nvGrpSpPr>
-      <p:grpSpPr>
-        <a:xfrm>
-          <a:off x="0" y="0"/>
-          <a:ext cx="0" cy="0"/>
-          <a:chOff x="0" y="0"/>
-          <a:chExt cx="0" cy="0"/>
-        </a:xfrm>
-      </p:grpSpPr>
-      <p:sp>
-        <p:nvSpPr>
-          <p:cNvPr id="8" name="Rectangle 7">
+          <p:cNvPr id="17" name="Rectangle 16">
             <a:extLst>
               <a:ext uri="{FF2B5EF4-FFF2-40B4-BE49-F238E27FC236}">
                 <a16:creationId xmlns:a16="http://schemas.microsoft.com/office/drawing/2014/main" id="{4351DFE5-F63D-4BE0-BDA9-E3EB88F01AA5}"/>
@@ -7963,7 +7526,7 @@
       </p:sp>
       <p:pic>
         <p:nvPicPr>
-          <p:cNvPr id="10" name="Picture 9">
+          <p:cNvPr id="19" name="Picture 18">
             <a:extLst>
               <a:ext uri="{FF2B5EF4-FFF2-40B4-BE49-F238E27FC236}">
                 <a16:creationId xmlns:a16="http://schemas.microsoft.com/office/drawing/2014/main" id="{3AA16612-ACD2-4A16-8F2B-4514FD6BF28F}"/>
@@ -8011,7 +7574,7 @@
           <p:cNvPr id="2" name="Titre 1">
             <a:extLst>
               <a:ext uri="{FF2B5EF4-FFF2-40B4-BE49-F238E27FC236}">
-                <a16:creationId xmlns:a16="http://schemas.microsoft.com/office/drawing/2014/main" id="{774E7B70-A890-4070-BE73-DC43D622D0EF}"/>
+                <a16:creationId xmlns:a16="http://schemas.microsoft.com/office/drawing/2014/main" id="{0E8399BF-7572-4A1E-B687-4E11FBEA28D2}"/>
               </a:ext>
             </a:extLst>
           </p:cNvPr>
@@ -8041,7 +7604,7 @@
                   <a:srgbClr val="FFFFFF"/>
                 </a:solidFill>
               </a:rPr>
-              <a:t>Data used to resolve our problem</a:t>
+              <a:t>Introduction /Business Problem</a:t>
             </a:r>
           </a:p>
         </p:txBody>
@@ -8051,7 +7614,7 @@
           <p:cNvPr id="3" name="Espace réservé du contenu 2">
             <a:extLst>
               <a:ext uri="{FF2B5EF4-FFF2-40B4-BE49-F238E27FC236}">
-                <a16:creationId xmlns:a16="http://schemas.microsoft.com/office/drawing/2014/main" id="{BD27039A-431F-45AB-8ACF-443EE541D1A6}"/>
+                <a16:creationId xmlns:a16="http://schemas.microsoft.com/office/drawing/2014/main" id="{D51967D2-52AF-49AA-BF0E-E7A9A786EA47}"/>
               </a:ext>
             </a:extLst>
           </p:cNvPr>
@@ -8064,64 +7627,365 @@
         </p:nvSpPr>
         <p:spPr>
           <a:xfrm>
-            <a:off x="1179226" y="3092970"/>
-            <a:ext cx="9833548" cy="2693976"/>
+            <a:off x="1179074" y="2882213"/>
+            <a:ext cx="9833548" cy="410696"/>
           </a:xfrm>
         </p:spPr>
         <p:txBody>
           <a:bodyPr>
-            <a:normAutofit fontScale="85000" lnSpcReduction="20000"/>
+            <a:normAutofit fontScale="92500" lnSpcReduction="20000"/>
           </a:bodyPr>
           <a:lstStyle/>
           <a:p>
+            <a:pPr marL="0" indent="0">
+              <a:buNone/>
+            </a:pPr>
+            <a:r>
+              <a:rPr lang="en-US" dirty="0">
+                <a:solidFill>
+                  <a:srgbClr val="000000"/>
+                </a:solidFill>
+              </a:rPr>
+              <a:t>Bordeaux Metropole </a:t>
+            </a:r>
+            <a:r>
+              <a:rPr lang="en-US" b="1" dirty="0">
+                <a:solidFill>
+                  <a:srgbClr val="3A558A"/>
+                </a:solidFill>
+              </a:rPr>
+              <a:t>key</a:t>
+            </a:r>
+            <a:r>
+              <a:rPr lang="en-US" b="1" dirty="0">
+                <a:solidFill>
+                  <a:schemeClr val="accent1"/>
+                </a:solidFill>
+              </a:rPr>
+              <a:t> </a:t>
+            </a:r>
+            <a:r>
+              <a:rPr lang="en-US" b="1" dirty="0">
+                <a:solidFill>
+                  <a:srgbClr val="3A558A"/>
+                </a:solidFill>
+              </a:rPr>
+              <a:t>figures</a:t>
+            </a:r>
+            <a:r>
+              <a:rPr lang="en-US" b="1" dirty="0">
+                <a:solidFill>
+                  <a:schemeClr val="accent1"/>
+                </a:solidFill>
+              </a:rPr>
+              <a:t>  </a:t>
+            </a:r>
+            <a:r>
+              <a:rPr lang="en-US" dirty="0">
+                <a:solidFill>
+                  <a:srgbClr val="000000"/>
+                </a:solidFill>
+              </a:rPr>
+              <a:t>:</a:t>
+            </a:r>
+          </a:p>
+        </p:txBody>
+      </p:sp>
+      <p:pic>
+        <p:nvPicPr>
+          <p:cNvPr id="1026" name="Picture 2" descr="PLU Bordeaux Métropole (Plan Local d'Urbanisme) - Sporting Promotion">
+            <a:extLst>
+              <a:ext uri="{FF2B5EF4-FFF2-40B4-BE49-F238E27FC236}">
+                <a16:creationId xmlns:a16="http://schemas.microsoft.com/office/drawing/2014/main" id="{4149983B-F91E-47AF-AF9C-DD1391FC9614}"/>
+              </a:ext>
+            </a:extLst>
+          </p:cNvPr>
+          <p:cNvPicPr>
+            <a:picLocks noChangeAspect="1" noChangeArrowheads="1"/>
+          </p:cNvPicPr>
+          <p:nvPr/>
+        </p:nvPicPr>
+        <p:blipFill>
+          <a:blip r:embed="rId3">
+            <a:extLst>
+              <a:ext uri="{28A0092B-C50C-407E-A947-70E740481C1C}">
+                <a14:useLocalDpi xmlns:a14="http://schemas.microsoft.com/office/drawing/2010/main" val="0"/>
+              </a:ext>
+            </a:extLst>
+          </a:blip>
+          <a:srcRect/>
+          <a:stretch>
+            <a:fillRect/>
+          </a:stretch>
+        </p:blipFill>
+        <p:spPr bwMode="auto">
+          <a:xfrm>
+            <a:off x="6952439" y="2580367"/>
+            <a:ext cx="4615447" cy="4245896"/>
+          </a:xfrm>
+          <a:prstGeom prst="rect">
+            <a:avLst/>
+          </a:prstGeom>
+          <a:noFill/>
+          <a:extLst>
+            <a:ext uri="{909E8E84-426E-40DD-AFC4-6F175D3DCCD1}">
+              <a14:hiddenFill xmlns:a14="http://schemas.microsoft.com/office/drawing/2010/main">
+                <a:solidFill>
+                  <a:srgbClr val="FFFFFF"/>
+                </a:solidFill>
+              </a14:hiddenFill>
+            </a:ext>
+          </a:extLst>
+        </p:spPr>
+      </p:pic>
+      <p:pic>
+        <p:nvPicPr>
+          <p:cNvPr id="5" name="Graphique 4" descr="Ville">
+            <a:extLst>
+              <a:ext uri="{FF2B5EF4-FFF2-40B4-BE49-F238E27FC236}">
+                <a16:creationId xmlns:a16="http://schemas.microsoft.com/office/drawing/2014/main" id="{4EA33327-7F72-41DE-B5AE-17DE1E4089B2}"/>
+              </a:ext>
+            </a:extLst>
+          </p:cNvPr>
+          <p:cNvPicPr>
+            <a:picLocks noChangeAspect="1"/>
+          </p:cNvPicPr>
+          <p:nvPr/>
+        </p:nvPicPr>
+        <p:blipFill>
+          <a:blip r:embed="rId4">
+            <a:extLst>
+              <a:ext uri="{28A0092B-C50C-407E-A947-70E740481C1C}">
+                <a14:useLocalDpi xmlns:a14="http://schemas.microsoft.com/office/drawing/2010/main" val="0"/>
+              </a:ext>
+              <a:ext uri="{96DAC541-7B7A-43D3-8B79-37D633B846F1}">
+                <asvg:svgBlip xmlns:asvg="http://schemas.microsoft.com/office/drawing/2016/SVG/main" r:embed="rId5"/>
+              </a:ext>
+            </a:extLst>
+          </a:blip>
+          <a:stretch>
+            <a:fillRect/>
+          </a:stretch>
+        </p:blipFill>
+        <p:spPr>
+          <a:xfrm>
+            <a:off x="1556598" y="3503666"/>
+            <a:ext cx="914400" cy="914400"/>
+          </a:xfrm>
+          <a:prstGeom prst="rect">
+            <a:avLst/>
+          </a:prstGeom>
+        </p:spPr>
+      </p:pic>
+      <p:sp>
+        <p:nvSpPr>
+          <p:cNvPr id="6" name="ZoneTexte 5">
+            <a:extLst>
+              <a:ext uri="{FF2B5EF4-FFF2-40B4-BE49-F238E27FC236}">
+                <a16:creationId xmlns:a16="http://schemas.microsoft.com/office/drawing/2014/main" id="{F52CB48E-F592-48B4-8505-3DE7320394AC}"/>
+              </a:ext>
+            </a:extLst>
+          </p:cNvPr>
+          <p:cNvSpPr txBox="1"/>
+          <p:nvPr/>
+        </p:nvSpPr>
+        <p:spPr>
+          <a:xfrm>
+            <a:off x="2638020" y="3776200"/>
+            <a:ext cx="3457979" cy="523220"/>
+          </a:xfrm>
+          <a:prstGeom prst="rect">
+            <a:avLst/>
+          </a:prstGeom>
+          <a:noFill/>
+        </p:spPr>
+        <p:txBody>
+          <a:bodyPr wrap="square" rtlCol="0">
+            <a:spAutoFit/>
+          </a:bodyPr>
+          <a:lstStyle/>
+          <a:p>
+            <a:r>
+              <a:rPr lang="en-GB" sz="2800" b="1" dirty="0"/>
+              <a:t>28 </a:t>
+            </a:r>
+            <a:r>
+              <a:rPr lang="en-GB" dirty="0"/>
+              <a:t>towns, many </a:t>
+            </a:r>
             <a:r>
               <a:rPr lang="en-US" dirty="0"/>
-              <a:t>Describe the data that you will be using to solve the problem or execute your idea. Remember that you will need to use the Foursquare location data to solve the problem or execute your idea. You can absolutely use other datasets in combination with the Foursquare location data. So make sure that you provide adequate explanation and discussion, with examples, of the data that you will be using, even if it is only Foursquare location data.</a:t>
-            </a:r>
-          </a:p>
-          <a:p>
-            <a:r>
-              <a:rPr lang="en-US" dirty="0"/>
-              <a:t>This submission will eventually become your </a:t>
-            </a:r>
-            <a:r>
-              <a:rPr lang="en-US" b="1" dirty="0"/>
-              <a:t>Data</a:t>
-            </a:r>
-            <a:r>
-              <a:rPr lang="en-US" dirty="0"/>
-              <a:t> section in your final report. So I recommend that you push the report (having your </a:t>
-            </a:r>
-            <a:r>
-              <a:rPr lang="en-US" b="1" dirty="0"/>
-              <a:t>Data</a:t>
-            </a:r>
-            <a:r>
-              <a:rPr lang="en-US" dirty="0"/>
-              <a:t> section) to your </a:t>
-            </a:r>
-            <a:r>
-              <a:rPr lang="en-US" dirty="0" err="1"/>
-              <a:t>Github</a:t>
-            </a:r>
-            <a:r>
-              <a:rPr lang="en-US" dirty="0"/>
-              <a:t> repository and submit a link to it.</a:t>
-            </a:r>
-          </a:p>
-          <a:p>
-            <a:endParaRPr lang="en-GB" sz="2000" dirty="0">
-              <a:solidFill>
-                <a:srgbClr val="000000"/>
-              </a:solidFill>
-            </a:endParaRPr>
+              <a:t>neighborhoods</a:t>
+            </a:r>
+            <a:r>
+              <a:rPr lang="en-GB" dirty="0"/>
+              <a:t>  </a:t>
+            </a:r>
+          </a:p>
+        </p:txBody>
+      </p:sp>
+      <p:pic>
+        <p:nvPicPr>
+          <p:cNvPr id="10" name="Graphique 9" descr="Croissance de l'activité">
+            <a:extLst>
+              <a:ext uri="{FF2B5EF4-FFF2-40B4-BE49-F238E27FC236}">
+                <a16:creationId xmlns:a16="http://schemas.microsoft.com/office/drawing/2014/main" id="{7BEC0C4C-73AC-4194-A740-676D28B50234}"/>
+              </a:ext>
+            </a:extLst>
+          </p:cNvPr>
+          <p:cNvPicPr>
+            <a:picLocks noChangeAspect="1"/>
+          </p:cNvPicPr>
+          <p:nvPr/>
+        </p:nvPicPr>
+        <p:blipFill>
+          <a:blip r:embed="rId6">
+            <a:extLst>
+              <a:ext uri="{28A0092B-C50C-407E-A947-70E740481C1C}">
+                <a14:useLocalDpi xmlns:a14="http://schemas.microsoft.com/office/drawing/2010/main" val="0"/>
+              </a:ext>
+              <a:ext uri="{96DAC541-7B7A-43D3-8B79-37D633B846F1}">
+                <asvg:svgBlip xmlns:asvg="http://schemas.microsoft.com/office/drawing/2016/SVG/main" r:embed="rId7"/>
+              </a:ext>
+            </a:extLst>
+          </a:blip>
+          <a:stretch>
+            <a:fillRect/>
+          </a:stretch>
+        </p:blipFill>
+        <p:spPr>
+          <a:xfrm>
+            <a:off x="1556598" y="4418066"/>
+            <a:ext cx="914400" cy="914400"/>
+          </a:xfrm>
+          <a:prstGeom prst="rect">
+            <a:avLst/>
+          </a:prstGeom>
+        </p:spPr>
+      </p:pic>
+      <p:sp>
+        <p:nvSpPr>
+          <p:cNvPr id="14" name="ZoneTexte 13">
+            <a:extLst>
+              <a:ext uri="{FF2B5EF4-FFF2-40B4-BE49-F238E27FC236}">
+                <a16:creationId xmlns:a16="http://schemas.microsoft.com/office/drawing/2014/main" id="{17C1806A-68E4-4CFF-A7A1-A84E87A7D5AC}"/>
+              </a:ext>
+            </a:extLst>
+          </p:cNvPr>
+          <p:cNvSpPr txBox="1"/>
+          <p:nvPr/>
+        </p:nvSpPr>
+        <p:spPr>
+          <a:xfrm>
+            <a:off x="2638020" y="4675234"/>
+            <a:ext cx="4279978" cy="523220"/>
+          </a:xfrm>
+          <a:prstGeom prst="rect">
+            <a:avLst/>
+          </a:prstGeom>
+          <a:noFill/>
+        </p:spPr>
+        <p:txBody>
+          <a:bodyPr wrap="square" rtlCol="0">
+            <a:spAutoFit/>
+          </a:bodyPr>
+          <a:lstStyle/>
+          <a:p>
+            <a:r>
+              <a:rPr lang="en-GB" sz="2800" b="1" dirty="0"/>
+              <a:t>+ 1,5% </a:t>
+            </a:r>
+            <a:r>
+              <a:rPr lang="en-GB" dirty="0"/>
+              <a:t>demographic growth per year</a:t>
+            </a:r>
+            <a:endParaRPr lang="en-GB" sz="2800" dirty="0"/>
+          </a:p>
+        </p:txBody>
+      </p:sp>
+      <p:pic>
+        <p:nvPicPr>
+          <p:cNvPr id="12" name="Graphique 11" descr="Usine">
+            <a:extLst>
+              <a:ext uri="{FF2B5EF4-FFF2-40B4-BE49-F238E27FC236}">
+                <a16:creationId xmlns:a16="http://schemas.microsoft.com/office/drawing/2014/main" id="{B2973CBA-5C7F-42C6-B4BC-6CEFD7A9009C}"/>
+              </a:ext>
+            </a:extLst>
+          </p:cNvPr>
+          <p:cNvPicPr>
+            <a:picLocks noChangeAspect="1"/>
+          </p:cNvPicPr>
+          <p:nvPr/>
+        </p:nvPicPr>
+        <p:blipFill>
+          <a:blip r:embed="rId8">
+            <a:extLst>
+              <a:ext uri="{28A0092B-C50C-407E-A947-70E740481C1C}">
+                <a14:useLocalDpi xmlns:a14="http://schemas.microsoft.com/office/drawing/2010/main" val="0"/>
+              </a:ext>
+              <a:ext uri="{96DAC541-7B7A-43D3-8B79-37D633B846F1}">
+                <asvg:svgBlip xmlns:asvg="http://schemas.microsoft.com/office/drawing/2016/SVG/main" r:embed="rId9"/>
+              </a:ext>
+            </a:extLst>
+          </a:blip>
+          <a:stretch>
+            <a:fillRect/>
+          </a:stretch>
+        </p:blipFill>
+        <p:spPr>
+          <a:xfrm>
+            <a:off x="1556598" y="5332466"/>
+            <a:ext cx="914400" cy="914400"/>
+          </a:xfrm>
+          <a:prstGeom prst="rect">
+            <a:avLst/>
+          </a:prstGeom>
+        </p:spPr>
+      </p:pic>
+      <p:sp>
+        <p:nvSpPr>
+          <p:cNvPr id="18" name="ZoneTexte 17">
+            <a:extLst>
+              <a:ext uri="{FF2B5EF4-FFF2-40B4-BE49-F238E27FC236}">
+                <a16:creationId xmlns:a16="http://schemas.microsoft.com/office/drawing/2014/main" id="{92B51EAE-4DF8-4ACF-8A13-629E5C8FF39E}"/>
+              </a:ext>
+            </a:extLst>
+          </p:cNvPr>
+          <p:cNvSpPr txBox="1"/>
+          <p:nvPr/>
+        </p:nvSpPr>
+        <p:spPr>
+          <a:xfrm>
+            <a:off x="2638020" y="5528056"/>
+            <a:ext cx="4279978" cy="523220"/>
+          </a:xfrm>
+          <a:prstGeom prst="rect">
+            <a:avLst/>
+          </a:prstGeom>
+          <a:noFill/>
+        </p:spPr>
+        <p:txBody>
+          <a:bodyPr wrap="square" rtlCol="0">
+            <a:spAutoFit/>
+          </a:bodyPr>
+          <a:lstStyle/>
+          <a:p>
+            <a:r>
+              <a:rPr lang="en-GB" sz="2800" b="1" dirty="0"/>
+              <a:t>+ 2 000 </a:t>
+            </a:r>
+            <a:r>
+              <a:rPr lang="en-GB" dirty="0"/>
+              <a:t>jobs created per year</a:t>
+            </a:r>
+            <a:endParaRPr lang="en-GB" sz="2800" dirty="0"/>
           </a:p>
         </p:txBody>
       </p:sp>
     </p:spTree>
     <p:extLst>
       <p:ext uri="{BB962C8B-B14F-4D97-AF65-F5344CB8AC3E}">
-        <p14:creationId xmlns:p14="http://schemas.microsoft.com/office/powerpoint/2010/main" val="2283046801"/>
+        <p14:creationId xmlns:p14="http://schemas.microsoft.com/office/powerpoint/2010/main" val="362277071"/>
       </p:ext>
     </p:extLst>
   </p:cSld>
@@ -8131,846 +7995,7 @@
 </p:sld>
 </file>
 
-<file path=ppt/slides/slide15.xml><?xml version="1.0" encoding="utf-8"?>
-<p:sld xmlns:a="http://schemas.openxmlformats.org/drawingml/2006/main" xmlns:r="http://schemas.openxmlformats.org/officeDocument/2006/relationships" xmlns:p="http://schemas.openxmlformats.org/presentationml/2006/main">
-  <p:cSld>
-    <p:bg>
-      <p:bgPr>
-        <a:solidFill>
-          <a:schemeClr val="bg1"/>
-        </a:solidFill>
-        <a:effectLst/>
-      </p:bgPr>
-    </p:bg>
-    <p:spTree>
-      <p:nvGrpSpPr>
-        <p:cNvPr id="1" name=""/>
-        <p:cNvGrpSpPr/>
-        <p:nvPr/>
-      </p:nvGrpSpPr>
-      <p:grpSpPr>
-        <a:xfrm>
-          <a:off x="0" y="0"/>
-          <a:ext cx="0" cy="0"/>
-          <a:chOff x="0" y="0"/>
-          <a:chExt cx="0" cy="0"/>
-        </a:xfrm>
-      </p:grpSpPr>
-      <p:sp>
-        <p:nvSpPr>
-          <p:cNvPr id="8" name="Rectangle 7">
-            <a:extLst>
-              <a:ext uri="{FF2B5EF4-FFF2-40B4-BE49-F238E27FC236}">
-                <a16:creationId xmlns:a16="http://schemas.microsoft.com/office/drawing/2014/main" id="{B164D969-46F1-44FC-B488-3FA68C67756D}"/>
-              </a:ext>
-              <a:ext uri="{C183D7F6-B498-43B3-948B-1728B52AA6E4}">
-                <adec:decorative xmlns:adec="http://schemas.microsoft.com/office/drawing/2017/decorative" val="1"/>
-              </a:ext>
-            </a:extLst>
-          </p:cNvPr>
-          <p:cNvSpPr>
-            <a:spLocks noGrp="1" noRot="1" noChangeAspect="1" noMove="1" noResize="1" noEditPoints="1" noAdjustHandles="1" noChangeArrowheads="1" noChangeShapeType="1" noTextEdit="1"/>
-          </p:cNvSpPr>
-          <p:nvPr>
-            <p:extLst>
-              <p:ext uri="{386F3935-93C4-4BCD-93E2-E3B085C9AB24}">
-                <p16:designElem xmlns:p16="http://schemas.microsoft.com/office/powerpoint/2015/main" val="1"/>
-              </p:ext>
-            </p:extLst>
-          </p:nvPr>
-        </p:nvSpPr>
-        <p:spPr>
-          <a:xfrm>
-            <a:off x="0" y="201707"/>
-            <a:ext cx="12188952" cy="6656293"/>
-          </a:xfrm>
-          <a:prstGeom prst="rect">
-            <a:avLst/>
-          </a:prstGeom>
-          <a:gradFill>
-            <a:gsLst>
-              <a:gs pos="0">
-                <a:schemeClr val="accent1">
-                  <a:lumMod val="90000"/>
-                </a:schemeClr>
-              </a:gs>
-              <a:gs pos="25000">
-                <a:schemeClr val="accent1">
-                  <a:lumMod val="90000"/>
-                </a:schemeClr>
-              </a:gs>
-              <a:gs pos="94000">
-                <a:schemeClr val="bg2">
-                  <a:lumMod val="25000"/>
-                </a:schemeClr>
-              </a:gs>
-              <a:gs pos="100000">
-                <a:schemeClr val="bg2">
-                  <a:lumMod val="25000"/>
-                </a:schemeClr>
-              </a:gs>
-            </a:gsLst>
-            <a:lin ang="4200000" scaled="0"/>
-          </a:gradFill>
-          <a:ln>
-            <a:noFill/>
-          </a:ln>
-        </p:spPr>
-        <p:style>
-          <a:lnRef idx="2">
-            <a:schemeClr val="accent1">
-              <a:shade val="50000"/>
-            </a:schemeClr>
-          </a:lnRef>
-          <a:fillRef idx="1">
-            <a:schemeClr val="accent1"/>
-          </a:fillRef>
-          <a:effectRef idx="0">
-            <a:schemeClr val="accent1"/>
-          </a:effectRef>
-          <a:fontRef idx="minor">
-            <a:schemeClr val="lt1"/>
-          </a:fontRef>
-        </p:style>
-        <p:txBody>
-          <a:bodyPr rtlCol="0" anchor="ctr"/>
-          <a:lstStyle/>
-          <a:p>
-            <a:pPr algn="ctr"/>
-            <a:endParaRPr lang="en-US"/>
-          </a:p>
-        </p:txBody>
-      </p:sp>
-      <p:pic>
-        <p:nvPicPr>
-          <p:cNvPr id="10" name="Picture 9">
-            <a:extLst>
-              <a:ext uri="{FF2B5EF4-FFF2-40B4-BE49-F238E27FC236}">
-                <a16:creationId xmlns:a16="http://schemas.microsoft.com/office/drawing/2014/main" id="{F3003D4E-E9FF-4669-90E7-7CED081587F1}"/>
-              </a:ext>
-              <a:ext uri="{C183D7F6-B498-43B3-948B-1728B52AA6E4}">
-                <adec:decorative xmlns:adec="http://schemas.microsoft.com/office/drawing/2017/decorative" val="1"/>
-              </a:ext>
-            </a:extLst>
-          </p:cNvPr>
-          <p:cNvPicPr>
-            <a:picLocks noGrp="1" noRot="1" noChangeAspect="1" noMove="1" noResize="1" noEditPoints="1" noAdjustHandles="1" noChangeArrowheads="1" noChangeShapeType="1" noCrop="1"/>
-          </p:cNvPicPr>
-          <p:nvPr>
-            <p:extLst>
-              <p:ext uri="{386F3935-93C4-4BCD-93E2-E3B085C9AB24}">
-                <p16:designElem xmlns:p16="http://schemas.microsoft.com/office/powerpoint/2015/main" val="1"/>
-              </p:ext>
-            </p:extLst>
-          </p:nvPr>
-        </p:nvPicPr>
-        <p:blipFill rotWithShape="1">
-          <a:blip r:embed="rId2">
-            <a:extLst>
-              <a:ext uri="{28A0092B-C50C-407E-A947-70E740481C1C}">
-                <a14:useLocalDpi xmlns:a14="http://schemas.microsoft.com/office/drawing/2010/main" val="0"/>
-              </a:ext>
-            </a:extLst>
-          </a:blip>
-          <a:srcRect l="8235" t="20008" r="8214" b="57101"/>
-          <a:stretch/>
-        </p:blipFill>
-        <p:spPr>
-          <a:xfrm flipV="1">
-            <a:off x="2" y="1"/>
-            <a:ext cx="12191999" cy="1878950"/>
-          </a:xfrm>
-          <a:custGeom>
-            <a:avLst/>
-            <a:gdLst>
-              <a:gd name="connsiteX0" fmla="*/ 0 w 12191999"/>
-              <a:gd name="connsiteY0" fmla="*/ 1878950 h 1878950"/>
-              <a:gd name="connsiteX1" fmla="*/ 12191999 w 12191999"/>
-              <a:gd name="connsiteY1" fmla="*/ 1878950 h 1878950"/>
-              <a:gd name="connsiteX2" fmla="*/ 12191999 w 12191999"/>
-              <a:gd name="connsiteY2" fmla="*/ 0 h 1878950"/>
-              <a:gd name="connsiteX3" fmla="*/ 0 w 12191999"/>
-              <a:gd name="connsiteY3" fmla="*/ 0 h 1878950"/>
-            </a:gdLst>
-            <a:ahLst/>
-            <a:cxnLst>
-              <a:cxn ang="0">
-                <a:pos x="connsiteX0" y="connsiteY0"/>
-              </a:cxn>
-              <a:cxn ang="0">
-                <a:pos x="connsiteX1" y="connsiteY1"/>
-              </a:cxn>
-              <a:cxn ang="0">
-                <a:pos x="connsiteX2" y="connsiteY2"/>
-              </a:cxn>
-              <a:cxn ang="0">
-                <a:pos x="connsiteX3" y="connsiteY3"/>
-              </a:cxn>
-            </a:cxnLst>
-            <a:rect l="l" t="t" r="r" b="b"/>
-            <a:pathLst>
-              <a:path w="12191999" h="1878950">
-                <a:moveTo>
-                  <a:pt x="0" y="1878950"/>
-                </a:moveTo>
-                <a:lnTo>
-                  <a:pt x="12191999" y="1878950"/>
-                </a:lnTo>
-                <a:lnTo>
-                  <a:pt x="12191999" y="0"/>
-                </a:lnTo>
-                <a:lnTo>
-                  <a:pt x="0" y="0"/>
-                </a:lnTo>
-                <a:close/>
-              </a:path>
-            </a:pathLst>
-          </a:custGeom>
-        </p:spPr>
-      </p:pic>
-      <p:pic>
-        <p:nvPicPr>
-          <p:cNvPr id="12" name="Picture 11">
-            <a:extLst>
-              <a:ext uri="{FF2B5EF4-FFF2-40B4-BE49-F238E27FC236}">
-                <a16:creationId xmlns:a16="http://schemas.microsoft.com/office/drawing/2014/main" id="{A7D98261-3895-4FB5-B9CE-26FAF635730F}"/>
-              </a:ext>
-              <a:ext uri="{C183D7F6-B498-43B3-948B-1728B52AA6E4}">
-                <adec:decorative xmlns:adec="http://schemas.microsoft.com/office/drawing/2017/decorative" val="1"/>
-              </a:ext>
-            </a:extLst>
-          </p:cNvPr>
-          <p:cNvPicPr>
-            <a:picLocks noGrp="1" noRot="1" noChangeAspect="1" noMove="1" noResize="1" noEditPoints="1" noAdjustHandles="1" noChangeArrowheads="1" noChangeShapeType="1" noCrop="1"/>
-          </p:cNvPicPr>
-          <p:nvPr>
-            <p:extLst>
-              <p:ext uri="{386F3935-93C4-4BCD-93E2-E3B085C9AB24}">
-                <p16:designElem xmlns:p16="http://schemas.microsoft.com/office/powerpoint/2015/main" val="1"/>
-              </p:ext>
-            </p:extLst>
-          </p:nvPr>
-        </p:nvPicPr>
-        <p:blipFill rotWithShape="1">
-          <a:blip r:embed="rId2">
-            <a:extLst>
-              <a:ext uri="{28A0092B-C50C-407E-A947-70E740481C1C}">
-                <a14:useLocalDpi xmlns:a14="http://schemas.microsoft.com/office/drawing/2010/main" val="0"/>
-              </a:ext>
-            </a:extLst>
-          </a:blip>
-          <a:srcRect l="8235" t="-1" r="8214" b="80325"/>
-          <a:stretch/>
-        </p:blipFill>
-        <p:spPr>
-          <a:xfrm flipV="1">
-            <a:off x="0" y="4914024"/>
-            <a:ext cx="12191999" cy="1614974"/>
-          </a:xfrm>
-          <a:custGeom>
-            <a:avLst/>
-            <a:gdLst>
-              <a:gd name="connsiteX0" fmla="*/ 0 w 12191999"/>
-              <a:gd name="connsiteY0" fmla="*/ 1614974 h 1614974"/>
-              <a:gd name="connsiteX1" fmla="*/ 12191999 w 12191999"/>
-              <a:gd name="connsiteY1" fmla="*/ 1614974 h 1614974"/>
-              <a:gd name="connsiteX2" fmla="*/ 12191999 w 12191999"/>
-              <a:gd name="connsiteY2" fmla="*/ 0 h 1614974"/>
-              <a:gd name="connsiteX3" fmla="*/ 0 w 12191999"/>
-              <a:gd name="connsiteY3" fmla="*/ 0 h 1614974"/>
-            </a:gdLst>
-            <a:ahLst/>
-            <a:cxnLst>
-              <a:cxn ang="0">
-                <a:pos x="connsiteX0" y="connsiteY0"/>
-              </a:cxn>
-              <a:cxn ang="0">
-                <a:pos x="connsiteX1" y="connsiteY1"/>
-              </a:cxn>
-              <a:cxn ang="0">
-                <a:pos x="connsiteX2" y="connsiteY2"/>
-              </a:cxn>
-              <a:cxn ang="0">
-                <a:pos x="connsiteX3" y="connsiteY3"/>
-              </a:cxn>
-            </a:cxnLst>
-            <a:rect l="l" t="t" r="r" b="b"/>
-            <a:pathLst>
-              <a:path w="12191999" h="1614974">
-                <a:moveTo>
-                  <a:pt x="0" y="1614974"/>
-                </a:moveTo>
-                <a:lnTo>
-                  <a:pt x="12191999" y="1614974"/>
-                </a:lnTo>
-                <a:lnTo>
-                  <a:pt x="12191999" y="0"/>
-                </a:lnTo>
-                <a:lnTo>
-                  <a:pt x="0" y="0"/>
-                </a:lnTo>
-                <a:close/>
-              </a:path>
-            </a:pathLst>
-          </a:custGeom>
-        </p:spPr>
-      </p:pic>
-      <p:sp>
-        <p:nvSpPr>
-          <p:cNvPr id="2" name="Titre 1">
-            <a:extLst>
-              <a:ext uri="{FF2B5EF4-FFF2-40B4-BE49-F238E27FC236}">
-                <a16:creationId xmlns:a16="http://schemas.microsoft.com/office/drawing/2014/main" id="{88BAC77E-95B9-401E-83F2-2B4991169633}"/>
-              </a:ext>
-            </a:extLst>
-          </p:cNvPr>
-          <p:cNvSpPr>
-            <a:spLocks noGrp="1"/>
-          </p:cNvSpPr>
-          <p:nvPr>
-            <p:ph type="title"/>
-          </p:nvPr>
-        </p:nvSpPr>
-        <p:spPr>
-          <a:xfrm>
-            <a:off x="805661" y="1401859"/>
-            <a:ext cx="3510845" cy="4054282"/>
-          </a:xfrm>
-        </p:spPr>
-        <p:txBody>
-          <a:bodyPr>
-            <a:normAutofit/>
-          </a:bodyPr>
-          <a:lstStyle/>
-          <a:p>
-            <a:endParaRPr lang="en-GB" sz="4000">
-              <a:solidFill>
-                <a:srgbClr val="FFFFFF"/>
-              </a:solidFill>
-            </a:endParaRPr>
-          </a:p>
-        </p:txBody>
-      </p:sp>
-      <p:sp>
-        <p:nvSpPr>
-          <p:cNvPr id="3" name="Espace réservé du contenu 2">
-            <a:extLst>
-              <a:ext uri="{FF2B5EF4-FFF2-40B4-BE49-F238E27FC236}">
-                <a16:creationId xmlns:a16="http://schemas.microsoft.com/office/drawing/2014/main" id="{60FAFE65-B741-4D9E-AD0F-CCC81AC722C3}"/>
-              </a:ext>
-            </a:extLst>
-          </p:cNvPr>
-          <p:cNvSpPr>
-            <a:spLocks noGrp="1"/>
-          </p:cNvSpPr>
-          <p:nvPr>
-            <p:ph idx="1"/>
-          </p:nvPr>
-        </p:nvSpPr>
-        <p:spPr>
-          <a:xfrm>
-            <a:off x="5257800" y="1553134"/>
-            <a:ext cx="6128539" cy="3751732"/>
-          </a:xfrm>
-        </p:spPr>
-        <p:txBody>
-          <a:bodyPr anchor="ctr">
-            <a:normAutofit/>
-          </a:bodyPr>
-          <a:lstStyle/>
-          <a:p>
-            <a:endParaRPr lang="en-GB" sz="2200">
-              <a:solidFill>
-                <a:srgbClr val="FFFFFF"/>
-              </a:solidFill>
-            </a:endParaRPr>
-          </a:p>
-        </p:txBody>
-      </p:sp>
-      <p:sp>
-        <p:nvSpPr>
-          <p:cNvPr id="14" name="Rectangle 13">
-            <a:extLst>
-              <a:ext uri="{FF2B5EF4-FFF2-40B4-BE49-F238E27FC236}">
-                <a16:creationId xmlns:a16="http://schemas.microsoft.com/office/drawing/2014/main" id="{9E0A01E6-95B9-424D-93AE-19F4928DFD40}"/>
-              </a:ext>
-              <a:ext uri="{C183D7F6-B498-43B3-948B-1728B52AA6E4}">
-                <adec:decorative xmlns:adec="http://schemas.microsoft.com/office/drawing/2017/decorative" val="1"/>
-              </a:ext>
-            </a:extLst>
-          </p:cNvPr>
-          <p:cNvSpPr>
-            <a:spLocks noGrp="1" noRot="1" noChangeAspect="1" noMove="1" noResize="1" noEditPoints="1" noAdjustHandles="1" noChangeArrowheads="1" noChangeShapeType="1" noTextEdit="1"/>
-          </p:cNvSpPr>
-          <p:nvPr>
-            <p:extLst>
-              <p:ext uri="{386F3935-93C4-4BCD-93E2-E3B085C9AB24}">
-                <p16:designElem xmlns:p16="http://schemas.microsoft.com/office/powerpoint/2015/main" val="1"/>
-              </p:ext>
-            </p:extLst>
-          </p:nvPr>
-        </p:nvSpPr>
-        <p:spPr>
-          <a:xfrm>
-            <a:off x="0" y="6044454"/>
-            <a:ext cx="12188952" cy="813546"/>
-          </a:xfrm>
-          <a:prstGeom prst="rect">
-            <a:avLst/>
-          </a:prstGeom>
-          <a:solidFill>
-            <a:srgbClr val="FFFFFF"/>
-          </a:solidFill>
-          <a:ln>
-            <a:noFill/>
-          </a:ln>
-        </p:spPr>
-        <p:style>
-          <a:lnRef idx="2">
-            <a:schemeClr val="accent1">
-              <a:shade val="50000"/>
-            </a:schemeClr>
-          </a:lnRef>
-          <a:fillRef idx="1">
-            <a:schemeClr val="accent1"/>
-          </a:fillRef>
-          <a:effectRef idx="0">
-            <a:schemeClr val="accent1"/>
-          </a:effectRef>
-          <a:fontRef idx="minor">
-            <a:schemeClr val="lt1"/>
-          </a:fontRef>
-        </p:style>
-        <p:txBody>
-          <a:bodyPr rtlCol="0" anchor="ctr"/>
-          <a:lstStyle/>
-          <a:p>
-            <a:pPr algn="ctr"/>
-            <a:endParaRPr lang="en-US"/>
-          </a:p>
-        </p:txBody>
-      </p:sp>
-    </p:spTree>
-    <p:extLst>
-      <p:ext uri="{BB962C8B-B14F-4D97-AF65-F5344CB8AC3E}">
-        <p14:creationId xmlns:p14="http://schemas.microsoft.com/office/powerpoint/2010/main" val="4122586098"/>
-      </p:ext>
-    </p:extLst>
-  </p:cSld>
-  <p:clrMapOvr>
-    <a:masterClrMapping/>
-  </p:clrMapOvr>
-</p:sld>
-</file>
-
-<file path=ppt/slides/slide16.xml><?xml version="1.0" encoding="utf-8"?>
-<p:sld xmlns:a="http://schemas.openxmlformats.org/drawingml/2006/main" xmlns:r="http://schemas.openxmlformats.org/officeDocument/2006/relationships" xmlns:p="http://schemas.openxmlformats.org/presentationml/2006/main">
-  <p:cSld>
-    <p:bg>
-      <p:bgPr>
-        <a:solidFill>
-          <a:schemeClr val="bg1"/>
-        </a:solidFill>
-        <a:effectLst/>
-      </p:bgPr>
-    </p:bg>
-    <p:spTree>
-      <p:nvGrpSpPr>
-        <p:cNvPr id="1" name=""/>
-        <p:cNvGrpSpPr/>
-        <p:nvPr/>
-      </p:nvGrpSpPr>
-      <p:grpSpPr>
-        <a:xfrm>
-          <a:off x="0" y="0"/>
-          <a:ext cx="0" cy="0"/>
-          <a:chOff x="0" y="0"/>
-          <a:chExt cx="0" cy="0"/>
-        </a:xfrm>
-      </p:grpSpPr>
-      <p:sp>
-        <p:nvSpPr>
-          <p:cNvPr id="13" name="Rectangle 7">
-            <a:extLst>
-              <a:ext uri="{FF2B5EF4-FFF2-40B4-BE49-F238E27FC236}">
-                <a16:creationId xmlns:a16="http://schemas.microsoft.com/office/drawing/2014/main" id="{D3FFFA32-D9F4-4AF9-A025-CD128AC85E32}"/>
-              </a:ext>
-              <a:ext uri="{C183D7F6-B498-43B3-948B-1728B52AA6E4}">
-                <adec:decorative xmlns:adec="http://schemas.microsoft.com/office/drawing/2017/decorative" val="1"/>
-              </a:ext>
-            </a:extLst>
-          </p:cNvPr>
-          <p:cNvSpPr>
-            <a:spLocks noGrp="1" noRot="1" noChangeAspect="1" noMove="1" noResize="1" noEditPoints="1" noAdjustHandles="1" noChangeArrowheads="1" noChangeShapeType="1" noTextEdit="1"/>
-          </p:cNvSpPr>
-          <p:nvPr>
-            <p:extLst>
-              <p:ext uri="{386F3935-93C4-4BCD-93E2-E3B085C9AB24}">
-                <p16:designElem xmlns:p16="http://schemas.microsoft.com/office/powerpoint/2015/main" val="1"/>
-              </p:ext>
-            </p:extLst>
-          </p:nvPr>
-        </p:nvSpPr>
-        <p:spPr>
-          <a:xfrm>
-            <a:off x="0" y="0"/>
-            <a:ext cx="12192000" cy="5570220"/>
-          </a:xfrm>
-          <a:prstGeom prst="rect">
-            <a:avLst/>
-          </a:prstGeom>
-          <a:gradFill>
-            <a:gsLst>
-              <a:gs pos="0">
-                <a:schemeClr val="accent1">
-                  <a:lumMod val="90000"/>
-                </a:schemeClr>
-              </a:gs>
-              <a:gs pos="25000">
-                <a:schemeClr val="accent1">
-                  <a:lumMod val="90000"/>
-                </a:schemeClr>
-              </a:gs>
-              <a:gs pos="94000">
-                <a:schemeClr val="bg2">
-                  <a:lumMod val="25000"/>
-                </a:schemeClr>
-              </a:gs>
-              <a:gs pos="100000">
-                <a:schemeClr val="bg2">
-                  <a:lumMod val="25000"/>
-                </a:schemeClr>
-              </a:gs>
-            </a:gsLst>
-            <a:lin ang="4200000" scaled="0"/>
-          </a:gradFill>
-          <a:ln>
-            <a:noFill/>
-          </a:ln>
-        </p:spPr>
-        <p:style>
-          <a:lnRef idx="2">
-            <a:schemeClr val="accent1">
-              <a:shade val="50000"/>
-            </a:schemeClr>
-          </a:lnRef>
-          <a:fillRef idx="1">
-            <a:schemeClr val="accent1"/>
-          </a:fillRef>
-          <a:effectRef idx="0">
-            <a:schemeClr val="accent1"/>
-          </a:effectRef>
-          <a:fontRef idx="minor">
-            <a:schemeClr val="lt1"/>
-          </a:fontRef>
-        </p:style>
-        <p:txBody>
-          <a:bodyPr rtlCol="0" anchor="ctr"/>
-          <a:lstStyle/>
-          <a:p>
-            <a:pPr algn="ctr"/>
-            <a:endParaRPr lang="en-US"/>
-          </a:p>
-        </p:txBody>
-      </p:sp>
-      <p:grpSp>
-        <p:nvGrpSpPr>
-          <p:cNvPr id="14" name="Group 9">
-            <a:extLst>
-              <a:ext uri="{FF2B5EF4-FFF2-40B4-BE49-F238E27FC236}">
-                <a16:creationId xmlns:a16="http://schemas.microsoft.com/office/drawing/2014/main" id="{2823A416-999C-4FA3-A853-0AE48404B5D7}"/>
-              </a:ext>
-              <a:ext uri="{C183D7F6-B498-43B3-948B-1728B52AA6E4}">
-                <adec:decorative xmlns:adec="http://schemas.microsoft.com/office/drawing/2017/decorative" val="1"/>
-              </a:ext>
-            </a:extLst>
-          </p:cNvPr>
-          <p:cNvGrpSpPr>
-            <a:grpSpLocks noGrp="1" noUngrp="1" noRot="1" noChangeAspect="1" noMove="1" noResize="1"/>
-          </p:cNvGrpSpPr>
-          <p:nvPr>
-            <p:extLst>
-              <p:ext uri="{386F3935-93C4-4BCD-93E2-E3B085C9AB24}">
-                <p16:designElem xmlns:p16="http://schemas.microsoft.com/office/powerpoint/2015/main" val="1"/>
-              </p:ext>
-            </p:extLst>
-          </p:nvPr>
-        </p:nvGrpSpPr>
-        <p:grpSpPr>
-          <a:xfrm>
-            <a:off x="0" y="3808676"/>
-            <a:ext cx="12192000" cy="3049325"/>
-            <a:chOff x="0" y="3808676"/>
-            <a:chExt cx="12192000" cy="3049325"/>
-          </a:xfrm>
-        </p:grpSpPr>
-        <p:pic>
-          <p:nvPicPr>
-            <p:cNvPr id="11" name="Picture 10">
-              <a:extLst>
-                <a:ext uri="{FF2B5EF4-FFF2-40B4-BE49-F238E27FC236}">
-                  <a16:creationId xmlns:a16="http://schemas.microsoft.com/office/drawing/2014/main" id="{9362F656-1A8D-4BA3-BA72-92332E75DB99}"/>
-                </a:ext>
-                <a:ext uri="{C183D7F6-B498-43B3-948B-1728B52AA6E4}">
-                  <adec:decorative xmlns:adec="http://schemas.microsoft.com/office/drawing/2017/decorative" val="1"/>
-                </a:ext>
-              </a:extLst>
-            </p:cNvPr>
-            <p:cNvPicPr>
-              <a:picLocks noChangeAspect="1"/>
-            </p:cNvPicPr>
-            <p:nvPr>
-              <p:extLst>
-                <p:ext uri="{386F3935-93C4-4BCD-93E2-E3B085C9AB24}">
-                  <p16:designElem xmlns:p16="http://schemas.microsoft.com/office/powerpoint/2015/main" val="1"/>
-                </p:ext>
-              </p:extLst>
-            </p:nvPr>
-          </p:nvPicPr>
-          <p:blipFill>
-            <a:blip r:embed="rId2">
-              <a:extLst>
-                <a:ext uri="{28A0092B-C50C-407E-A947-70E740481C1C}">
-                  <a14:useLocalDpi xmlns:a14="http://schemas.microsoft.com/office/drawing/2010/main" val="0"/>
-                </a:ext>
-              </a:extLst>
-            </a:blip>
-            <a:srcRect t="45716" b="9820"/>
-            <a:stretch>
-              <a:fillRect/>
-            </a:stretch>
-          </p:blipFill>
-          <p:spPr>
-            <a:xfrm>
-              <a:off x="0" y="3808676"/>
-              <a:ext cx="12192000" cy="3049325"/>
-            </a:xfrm>
-            <a:custGeom>
-              <a:avLst/>
-              <a:gdLst>
-                <a:gd name="connsiteX0" fmla="*/ 0 w 12192000"/>
-                <a:gd name="connsiteY0" fmla="*/ 0 h 3049325"/>
-                <a:gd name="connsiteX1" fmla="*/ 12192000 w 12192000"/>
-                <a:gd name="connsiteY1" fmla="*/ 0 h 3049325"/>
-                <a:gd name="connsiteX2" fmla="*/ 12192000 w 12192000"/>
-                <a:gd name="connsiteY2" fmla="*/ 3049325 h 3049325"/>
-                <a:gd name="connsiteX3" fmla="*/ 0 w 12192000"/>
-                <a:gd name="connsiteY3" fmla="*/ 3049325 h 3049325"/>
-              </a:gdLst>
-              <a:ahLst/>
-              <a:cxnLst>
-                <a:cxn ang="0">
-                  <a:pos x="connsiteX0" y="connsiteY0"/>
-                </a:cxn>
-                <a:cxn ang="0">
-                  <a:pos x="connsiteX1" y="connsiteY1"/>
-                </a:cxn>
-                <a:cxn ang="0">
-                  <a:pos x="connsiteX2" y="connsiteY2"/>
-                </a:cxn>
-                <a:cxn ang="0">
-                  <a:pos x="connsiteX3" y="connsiteY3"/>
-                </a:cxn>
-              </a:cxnLst>
-              <a:rect l="l" t="t" r="r" b="b"/>
-              <a:pathLst>
-                <a:path w="12192000" h="3049325">
-                  <a:moveTo>
-                    <a:pt x="0" y="0"/>
-                  </a:moveTo>
-                  <a:lnTo>
-                    <a:pt x="12192000" y="0"/>
-                  </a:lnTo>
-                  <a:lnTo>
-                    <a:pt x="12192000" y="3049325"/>
-                  </a:lnTo>
-                  <a:lnTo>
-                    <a:pt x="0" y="3049325"/>
-                  </a:lnTo>
-                  <a:close/>
-                </a:path>
-              </a:pathLst>
-            </a:custGeom>
-          </p:spPr>
-        </p:pic>
-        <p:sp>
-          <p:nvSpPr>
-            <p:cNvPr id="12" name="Oval 11">
-              <a:extLst>
-                <a:ext uri="{FF2B5EF4-FFF2-40B4-BE49-F238E27FC236}">
-                  <a16:creationId xmlns:a16="http://schemas.microsoft.com/office/drawing/2014/main" id="{9338807D-FB66-4E3A-9CF0-786662C4AB40}"/>
-                </a:ext>
-                <a:ext uri="{C183D7F6-B498-43B3-948B-1728B52AA6E4}">
-                  <adec:decorative xmlns:adec="http://schemas.microsoft.com/office/drawing/2017/decorative" val="1"/>
-                </a:ext>
-              </a:extLst>
-            </p:cNvPr>
-            <p:cNvSpPr/>
-            <p:nvPr>
-              <p:extLst>
-                <p:ext uri="{386F3935-93C4-4BCD-93E2-E3B085C9AB24}">
-                  <p16:designElem xmlns:p16="http://schemas.microsoft.com/office/powerpoint/2015/main" val="1"/>
-                </p:ext>
-              </p:extLst>
-            </p:nvPr>
-          </p:nvSpPr>
-          <p:spPr>
-            <a:xfrm>
-              <a:off x="2067339" y="5375082"/>
-              <a:ext cx="373711" cy="405516"/>
-            </a:xfrm>
-            <a:prstGeom prst="ellipse">
-              <a:avLst/>
-            </a:prstGeom>
-            <a:solidFill>
-              <a:srgbClr val="FFFFFF"/>
-            </a:solidFill>
-            <a:ln>
-              <a:noFill/>
-            </a:ln>
-          </p:spPr>
-          <p:style>
-            <a:lnRef idx="2">
-              <a:schemeClr val="accent1">
-                <a:shade val="50000"/>
-              </a:schemeClr>
-            </a:lnRef>
-            <a:fillRef idx="1">
-              <a:schemeClr val="accent1"/>
-            </a:fillRef>
-            <a:effectRef idx="0">
-              <a:schemeClr val="accent1"/>
-            </a:effectRef>
-            <a:fontRef idx="minor">
-              <a:schemeClr val="lt1"/>
-            </a:fontRef>
-          </p:style>
-          <p:txBody>
-            <a:bodyPr rtlCol="0" anchor="ctr"/>
-            <a:lstStyle/>
-            <a:p>
-              <a:pPr algn="ctr"/>
-              <a:endParaRPr lang="en-US"/>
-            </a:p>
-          </p:txBody>
-        </p:sp>
-      </p:grpSp>
-      <p:sp>
-        <p:nvSpPr>
-          <p:cNvPr id="2" name="Titre 1">
-            <a:extLst>
-              <a:ext uri="{FF2B5EF4-FFF2-40B4-BE49-F238E27FC236}">
-                <a16:creationId xmlns:a16="http://schemas.microsoft.com/office/drawing/2014/main" id="{5168A459-D81A-4467-AEED-229D00CE49E2}"/>
-              </a:ext>
-            </a:extLst>
-          </p:cNvPr>
-          <p:cNvSpPr>
-            <a:spLocks noGrp="1"/>
-          </p:cNvSpPr>
-          <p:nvPr>
-            <p:ph type="title"/>
-          </p:nvPr>
-        </p:nvSpPr>
-        <p:spPr>
-          <a:xfrm>
-            <a:off x="1179226" y="5105400"/>
-            <a:ext cx="9833548" cy="1066802"/>
-          </a:xfrm>
-        </p:spPr>
-        <p:txBody>
-          <a:bodyPr>
-            <a:normAutofit/>
-          </a:bodyPr>
-          <a:lstStyle/>
-          <a:p>
-            <a:endParaRPr lang="en-GB" sz="4000" dirty="0">
-              <a:solidFill>
-                <a:srgbClr val="3F3F3F"/>
-              </a:solidFill>
-            </a:endParaRPr>
-          </a:p>
-        </p:txBody>
-      </p:sp>
-      <p:sp>
-        <p:nvSpPr>
-          <p:cNvPr id="3" name="Espace réservé du contenu 2">
-            <a:extLst>
-              <a:ext uri="{FF2B5EF4-FFF2-40B4-BE49-F238E27FC236}">
-                <a16:creationId xmlns:a16="http://schemas.microsoft.com/office/drawing/2014/main" id="{15455F5A-502D-4B5B-A9DE-5A1E9690AFE7}"/>
-              </a:ext>
-            </a:extLst>
-          </p:cNvPr>
-          <p:cNvSpPr>
-            <a:spLocks noGrp="1"/>
-          </p:cNvSpPr>
-          <p:nvPr>
-            <p:ph idx="1"/>
-          </p:nvPr>
-        </p:nvSpPr>
-        <p:spPr>
-          <a:xfrm>
-            <a:off x="1179226" y="872046"/>
-            <a:ext cx="9833548" cy="2945574"/>
-          </a:xfrm>
-        </p:spPr>
-        <p:txBody>
-          <a:bodyPr anchor="ctr">
-            <a:normAutofit/>
-          </a:bodyPr>
-          <a:lstStyle/>
-          <a:p>
-            <a:endParaRPr lang="en-GB" sz="2400">
-              <a:solidFill>
-                <a:srgbClr val="FFFFFF"/>
-              </a:solidFill>
-            </a:endParaRPr>
-          </a:p>
-        </p:txBody>
-      </p:sp>
-      <p:pic>
-        <p:nvPicPr>
-          <p:cNvPr id="8" name="Image 7">
-            <a:extLst>
-              <a:ext uri="{FF2B5EF4-FFF2-40B4-BE49-F238E27FC236}">
-                <a16:creationId xmlns:a16="http://schemas.microsoft.com/office/drawing/2014/main" id="{4F094E99-9AE7-47FB-AD3D-F2BC2658C7BC}"/>
-              </a:ext>
-            </a:extLst>
-          </p:cNvPr>
-          <p:cNvPicPr>
-            <a:picLocks noChangeAspect="1"/>
-          </p:cNvPicPr>
-          <p:nvPr/>
-        </p:nvPicPr>
-        <p:blipFill>
-          <a:blip r:embed="rId3"/>
-          <a:stretch>
-            <a:fillRect/>
-          </a:stretch>
-        </p:blipFill>
-        <p:spPr>
-          <a:xfrm>
-            <a:off x="533400" y="3049325"/>
-            <a:ext cx="11125200" cy="3657600"/>
-          </a:xfrm>
-          <a:prstGeom prst="rect">
-            <a:avLst/>
-          </a:prstGeom>
-        </p:spPr>
-      </p:pic>
-    </p:spTree>
-    <p:extLst>
-      <p:ext uri="{BB962C8B-B14F-4D97-AF65-F5344CB8AC3E}">
-        <p14:creationId xmlns:p14="http://schemas.microsoft.com/office/powerpoint/2010/main" val="4064986124"/>
-      </p:ext>
-    </p:extLst>
-  </p:cSld>
-  <p:clrMapOvr>
-    <a:overrideClrMapping bg1="dk1" tx1="lt1" bg2="dk2" tx2="lt2" accent1="accent1" accent2="accent2" accent3="accent3" accent4="accent4" accent5="accent5" accent6="accent6" hlink="hlink" folHlink="folHlink"/>
-  </p:clrMapOvr>
-</p:sld>
-</file>
-
-<file path=ppt/slides/slide2.xml><?xml version="1.0" encoding="utf-8"?>
+<file path=ppt/slides/slide3.xml><?xml version="1.0" encoding="utf-8"?>
 <p:sld xmlns:a="http://schemas.openxmlformats.org/drawingml/2006/main" xmlns:r="http://schemas.openxmlformats.org/officeDocument/2006/relationships" xmlns:p="http://schemas.openxmlformats.org/presentationml/2006/main">
   <p:cSld>
     <p:bg>
@@ -9197,587 +8222,6 @@
               <a:buNone/>
             </a:pPr>
             <a:r>
-              <a:rPr lang="en-US" dirty="0">
-                <a:solidFill>
-                  <a:srgbClr val="000000"/>
-                </a:solidFill>
-              </a:rPr>
-              <a:t>Bordeaux Metropole </a:t>
-            </a:r>
-            <a:r>
-              <a:rPr lang="en-US" b="1" dirty="0">
-                <a:solidFill>
-                  <a:srgbClr val="3A558A"/>
-                </a:solidFill>
-              </a:rPr>
-              <a:t>key</a:t>
-            </a:r>
-            <a:r>
-              <a:rPr lang="en-US" b="1" dirty="0">
-                <a:solidFill>
-                  <a:schemeClr val="accent1"/>
-                </a:solidFill>
-              </a:rPr>
-              <a:t> </a:t>
-            </a:r>
-            <a:r>
-              <a:rPr lang="en-US" b="1" dirty="0">
-                <a:solidFill>
-                  <a:srgbClr val="3A558A"/>
-                </a:solidFill>
-              </a:rPr>
-              <a:t>figures</a:t>
-            </a:r>
-            <a:r>
-              <a:rPr lang="en-US" b="1" dirty="0">
-                <a:solidFill>
-                  <a:schemeClr val="accent1"/>
-                </a:solidFill>
-              </a:rPr>
-              <a:t>  </a:t>
-            </a:r>
-            <a:r>
-              <a:rPr lang="en-US" dirty="0">
-                <a:solidFill>
-                  <a:srgbClr val="000000"/>
-                </a:solidFill>
-              </a:rPr>
-              <a:t>:</a:t>
-            </a:r>
-          </a:p>
-        </p:txBody>
-      </p:sp>
-      <p:pic>
-        <p:nvPicPr>
-          <p:cNvPr id="1026" name="Picture 2" descr="PLU Bordeaux Métropole (Plan Local d'Urbanisme) - Sporting Promotion">
-            <a:extLst>
-              <a:ext uri="{FF2B5EF4-FFF2-40B4-BE49-F238E27FC236}">
-                <a16:creationId xmlns:a16="http://schemas.microsoft.com/office/drawing/2014/main" id="{4149983B-F91E-47AF-AF9C-DD1391FC9614}"/>
-              </a:ext>
-            </a:extLst>
-          </p:cNvPr>
-          <p:cNvPicPr>
-            <a:picLocks noChangeAspect="1" noChangeArrowheads="1"/>
-          </p:cNvPicPr>
-          <p:nvPr/>
-        </p:nvPicPr>
-        <p:blipFill>
-          <a:blip r:embed="rId3">
-            <a:extLst>
-              <a:ext uri="{28A0092B-C50C-407E-A947-70E740481C1C}">
-                <a14:useLocalDpi xmlns:a14="http://schemas.microsoft.com/office/drawing/2010/main" val="0"/>
-              </a:ext>
-            </a:extLst>
-          </a:blip>
-          <a:srcRect/>
-          <a:stretch>
-            <a:fillRect/>
-          </a:stretch>
-        </p:blipFill>
-        <p:spPr bwMode="auto">
-          <a:xfrm>
-            <a:off x="6952439" y="2580367"/>
-            <a:ext cx="4615447" cy="4245896"/>
-          </a:xfrm>
-          <a:prstGeom prst="rect">
-            <a:avLst/>
-          </a:prstGeom>
-          <a:noFill/>
-          <a:extLst>
-            <a:ext uri="{909E8E84-426E-40DD-AFC4-6F175D3DCCD1}">
-              <a14:hiddenFill xmlns:a14="http://schemas.microsoft.com/office/drawing/2010/main">
-                <a:solidFill>
-                  <a:srgbClr val="FFFFFF"/>
-                </a:solidFill>
-              </a14:hiddenFill>
-            </a:ext>
-          </a:extLst>
-        </p:spPr>
-      </p:pic>
-      <p:pic>
-        <p:nvPicPr>
-          <p:cNvPr id="5" name="Graphique 4" descr="Ville">
-            <a:extLst>
-              <a:ext uri="{FF2B5EF4-FFF2-40B4-BE49-F238E27FC236}">
-                <a16:creationId xmlns:a16="http://schemas.microsoft.com/office/drawing/2014/main" id="{4EA33327-7F72-41DE-B5AE-17DE1E4089B2}"/>
-              </a:ext>
-            </a:extLst>
-          </p:cNvPr>
-          <p:cNvPicPr>
-            <a:picLocks noChangeAspect="1"/>
-          </p:cNvPicPr>
-          <p:nvPr/>
-        </p:nvPicPr>
-        <p:blipFill>
-          <a:blip r:embed="rId4">
-            <a:extLst>
-              <a:ext uri="{28A0092B-C50C-407E-A947-70E740481C1C}">
-                <a14:useLocalDpi xmlns:a14="http://schemas.microsoft.com/office/drawing/2010/main" val="0"/>
-              </a:ext>
-              <a:ext uri="{96DAC541-7B7A-43D3-8B79-37D633B846F1}">
-                <asvg:svgBlip xmlns:asvg="http://schemas.microsoft.com/office/drawing/2016/SVG/main" r:embed="rId5"/>
-              </a:ext>
-            </a:extLst>
-          </a:blip>
-          <a:stretch>
-            <a:fillRect/>
-          </a:stretch>
-        </p:blipFill>
-        <p:spPr>
-          <a:xfrm>
-            <a:off x="1556598" y="3503666"/>
-            <a:ext cx="914400" cy="914400"/>
-          </a:xfrm>
-          <a:prstGeom prst="rect">
-            <a:avLst/>
-          </a:prstGeom>
-        </p:spPr>
-      </p:pic>
-      <p:sp>
-        <p:nvSpPr>
-          <p:cNvPr id="6" name="ZoneTexte 5">
-            <a:extLst>
-              <a:ext uri="{FF2B5EF4-FFF2-40B4-BE49-F238E27FC236}">
-                <a16:creationId xmlns:a16="http://schemas.microsoft.com/office/drawing/2014/main" id="{F52CB48E-F592-48B4-8505-3DE7320394AC}"/>
-              </a:ext>
-            </a:extLst>
-          </p:cNvPr>
-          <p:cNvSpPr txBox="1"/>
-          <p:nvPr/>
-        </p:nvSpPr>
-        <p:spPr>
-          <a:xfrm>
-            <a:off x="2638020" y="3776200"/>
-            <a:ext cx="3457979" cy="523220"/>
-          </a:xfrm>
-          <a:prstGeom prst="rect">
-            <a:avLst/>
-          </a:prstGeom>
-          <a:noFill/>
-        </p:spPr>
-        <p:txBody>
-          <a:bodyPr wrap="square" rtlCol="0">
-            <a:spAutoFit/>
-          </a:bodyPr>
-          <a:lstStyle/>
-          <a:p>
-            <a:r>
-              <a:rPr lang="en-GB" sz="2800" b="1" dirty="0"/>
-              <a:t>28 </a:t>
-            </a:r>
-            <a:r>
-              <a:rPr lang="en-GB" dirty="0"/>
-              <a:t>towns, many </a:t>
-            </a:r>
-            <a:r>
-              <a:rPr lang="en-US" dirty="0"/>
-              <a:t>neighborhoods</a:t>
-            </a:r>
-            <a:r>
-              <a:rPr lang="en-GB" dirty="0"/>
-              <a:t>  </a:t>
-            </a:r>
-          </a:p>
-        </p:txBody>
-      </p:sp>
-      <p:pic>
-        <p:nvPicPr>
-          <p:cNvPr id="10" name="Graphique 9" descr="Croissance de l'activité">
-            <a:extLst>
-              <a:ext uri="{FF2B5EF4-FFF2-40B4-BE49-F238E27FC236}">
-                <a16:creationId xmlns:a16="http://schemas.microsoft.com/office/drawing/2014/main" id="{7BEC0C4C-73AC-4194-A740-676D28B50234}"/>
-              </a:ext>
-            </a:extLst>
-          </p:cNvPr>
-          <p:cNvPicPr>
-            <a:picLocks noChangeAspect="1"/>
-          </p:cNvPicPr>
-          <p:nvPr/>
-        </p:nvPicPr>
-        <p:blipFill>
-          <a:blip r:embed="rId6">
-            <a:extLst>
-              <a:ext uri="{28A0092B-C50C-407E-A947-70E740481C1C}">
-                <a14:useLocalDpi xmlns:a14="http://schemas.microsoft.com/office/drawing/2010/main" val="0"/>
-              </a:ext>
-              <a:ext uri="{96DAC541-7B7A-43D3-8B79-37D633B846F1}">
-                <asvg:svgBlip xmlns:asvg="http://schemas.microsoft.com/office/drawing/2016/SVG/main" r:embed="rId7"/>
-              </a:ext>
-            </a:extLst>
-          </a:blip>
-          <a:stretch>
-            <a:fillRect/>
-          </a:stretch>
-        </p:blipFill>
-        <p:spPr>
-          <a:xfrm>
-            <a:off x="1556598" y="4418066"/>
-            <a:ext cx="914400" cy="914400"/>
-          </a:xfrm>
-          <a:prstGeom prst="rect">
-            <a:avLst/>
-          </a:prstGeom>
-        </p:spPr>
-      </p:pic>
-      <p:sp>
-        <p:nvSpPr>
-          <p:cNvPr id="14" name="ZoneTexte 13">
-            <a:extLst>
-              <a:ext uri="{FF2B5EF4-FFF2-40B4-BE49-F238E27FC236}">
-                <a16:creationId xmlns:a16="http://schemas.microsoft.com/office/drawing/2014/main" id="{17C1806A-68E4-4CFF-A7A1-A84E87A7D5AC}"/>
-              </a:ext>
-            </a:extLst>
-          </p:cNvPr>
-          <p:cNvSpPr txBox="1"/>
-          <p:nvPr/>
-        </p:nvSpPr>
-        <p:spPr>
-          <a:xfrm>
-            <a:off x="2638020" y="4675234"/>
-            <a:ext cx="4279978" cy="523220"/>
-          </a:xfrm>
-          <a:prstGeom prst="rect">
-            <a:avLst/>
-          </a:prstGeom>
-          <a:noFill/>
-        </p:spPr>
-        <p:txBody>
-          <a:bodyPr wrap="square" rtlCol="0">
-            <a:spAutoFit/>
-          </a:bodyPr>
-          <a:lstStyle/>
-          <a:p>
-            <a:r>
-              <a:rPr lang="en-GB" sz="2800" b="1" dirty="0"/>
-              <a:t>+ 1,5% </a:t>
-            </a:r>
-            <a:r>
-              <a:rPr lang="en-GB" dirty="0"/>
-              <a:t>demographic growth per year</a:t>
-            </a:r>
-            <a:endParaRPr lang="en-GB" sz="2800" dirty="0"/>
-          </a:p>
-        </p:txBody>
-      </p:sp>
-      <p:pic>
-        <p:nvPicPr>
-          <p:cNvPr id="12" name="Graphique 11" descr="Usine">
-            <a:extLst>
-              <a:ext uri="{FF2B5EF4-FFF2-40B4-BE49-F238E27FC236}">
-                <a16:creationId xmlns:a16="http://schemas.microsoft.com/office/drawing/2014/main" id="{B2973CBA-5C7F-42C6-B4BC-6CEFD7A9009C}"/>
-              </a:ext>
-            </a:extLst>
-          </p:cNvPr>
-          <p:cNvPicPr>
-            <a:picLocks noChangeAspect="1"/>
-          </p:cNvPicPr>
-          <p:nvPr/>
-        </p:nvPicPr>
-        <p:blipFill>
-          <a:blip r:embed="rId8">
-            <a:extLst>
-              <a:ext uri="{28A0092B-C50C-407E-A947-70E740481C1C}">
-                <a14:useLocalDpi xmlns:a14="http://schemas.microsoft.com/office/drawing/2010/main" val="0"/>
-              </a:ext>
-              <a:ext uri="{96DAC541-7B7A-43D3-8B79-37D633B846F1}">
-                <asvg:svgBlip xmlns:asvg="http://schemas.microsoft.com/office/drawing/2016/SVG/main" r:embed="rId9"/>
-              </a:ext>
-            </a:extLst>
-          </a:blip>
-          <a:stretch>
-            <a:fillRect/>
-          </a:stretch>
-        </p:blipFill>
-        <p:spPr>
-          <a:xfrm>
-            <a:off x="1556598" y="5332466"/>
-            <a:ext cx="914400" cy="914400"/>
-          </a:xfrm>
-          <a:prstGeom prst="rect">
-            <a:avLst/>
-          </a:prstGeom>
-        </p:spPr>
-      </p:pic>
-      <p:sp>
-        <p:nvSpPr>
-          <p:cNvPr id="18" name="ZoneTexte 17">
-            <a:extLst>
-              <a:ext uri="{FF2B5EF4-FFF2-40B4-BE49-F238E27FC236}">
-                <a16:creationId xmlns:a16="http://schemas.microsoft.com/office/drawing/2014/main" id="{92B51EAE-4DF8-4ACF-8A13-629E5C8FF39E}"/>
-              </a:ext>
-            </a:extLst>
-          </p:cNvPr>
-          <p:cNvSpPr txBox="1"/>
-          <p:nvPr/>
-        </p:nvSpPr>
-        <p:spPr>
-          <a:xfrm>
-            <a:off x="2638020" y="5528056"/>
-            <a:ext cx="4279978" cy="523220"/>
-          </a:xfrm>
-          <a:prstGeom prst="rect">
-            <a:avLst/>
-          </a:prstGeom>
-          <a:noFill/>
-        </p:spPr>
-        <p:txBody>
-          <a:bodyPr wrap="square" rtlCol="0">
-            <a:spAutoFit/>
-          </a:bodyPr>
-          <a:lstStyle/>
-          <a:p>
-            <a:r>
-              <a:rPr lang="en-GB" sz="2800" b="1" dirty="0"/>
-              <a:t>+ 2 000 </a:t>
-            </a:r>
-            <a:r>
-              <a:rPr lang="en-GB" dirty="0"/>
-              <a:t>jobs created per year</a:t>
-            </a:r>
-            <a:endParaRPr lang="en-GB" sz="2800" dirty="0"/>
-          </a:p>
-        </p:txBody>
-      </p:sp>
-    </p:spTree>
-    <p:extLst>
-      <p:ext uri="{BB962C8B-B14F-4D97-AF65-F5344CB8AC3E}">
-        <p14:creationId xmlns:p14="http://schemas.microsoft.com/office/powerpoint/2010/main" val="362277071"/>
-      </p:ext>
-    </p:extLst>
-  </p:cSld>
-  <p:clrMapOvr>
-    <a:masterClrMapping/>
-  </p:clrMapOvr>
-</p:sld>
-</file>
-
-<file path=ppt/slides/slide3.xml><?xml version="1.0" encoding="utf-8"?>
-<p:sld xmlns:a="http://schemas.openxmlformats.org/drawingml/2006/main" xmlns:r="http://schemas.openxmlformats.org/officeDocument/2006/relationships" xmlns:p="http://schemas.openxmlformats.org/presentationml/2006/main">
-  <p:cSld>
-    <p:bg>
-      <p:bgPr>
-        <a:solidFill>
-          <a:schemeClr val="bg1"/>
-        </a:solidFill>
-        <a:effectLst/>
-      </p:bgPr>
-    </p:bg>
-    <p:spTree>
-      <p:nvGrpSpPr>
-        <p:cNvPr id="1" name=""/>
-        <p:cNvGrpSpPr/>
-        <p:nvPr/>
-      </p:nvGrpSpPr>
-      <p:grpSpPr>
-        <a:xfrm>
-          <a:off x="0" y="0"/>
-          <a:ext cx="0" cy="0"/>
-          <a:chOff x="0" y="0"/>
-          <a:chExt cx="0" cy="0"/>
-        </a:xfrm>
-      </p:grpSpPr>
-      <p:sp>
-        <p:nvSpPr>
-          <p:cNvPr id="17" name="Rectangle 16">
-            <a:extLst>
-              <a:ext uri="{FF2B5EF4-FFF2-40B4-BE49-F238E27FC236}">
-                <a16:creationId xmlns:a16="http://schemas.microsoft.com/office/drawing/2014/main" id="{4351DFE5-F63D-4BE0-BDA9-E3EB88F01AA5}"/>
-              </a:ext>
-              <a:ext uri="{C183D7F6-B498-43B3-948B-1728B52AA6E4}">
-                <adec:decorative xmlns:adec="http://schemas.microsoft.com/office/drawing/2017/decorative" val="1"/>
-              </a:ext>
-            </a:extLst>
-          </p:cNvPr>
-          <p:cNvSpPr>
-            <a:spLocks noGrp="1" noRot="1" noChangeAspect="1" noMove="1" noResize="1" noEditPoints="1" noAdjustHandles="1" noChangeArrowheads="1" noChangeShapeType="1" noTextEdit="1"/>
-          </p:cNvSpPr>
-          <p:nvPr>
-            <p:extLst>
-              <p:ext uri="{386F3935-93C4-4BCD-93E2-E3B085C9AB24}">
-                <p16:designElem xmlns:p16="http://schemas.microsoft.com/office/powerpoint/2015/main" val="1"/>
-              </p:ext>
-            </p:extLst>
-          </p:nvPr>
-        </p:nvSpPr>
-        <p:spPr>
-          <a:xfrm>
-            <a:off x="355601" y="0"/>
-            <a:ext cx="11480494" cy="2753936"/>
-          </a:xfrm>
-          <a:prstGeom prst="rect">
-            <a:avLst/>
-          </a:prstGeom>
-          <a:gradFill>
-            <a:gsLst>
-              <a:gs pos="0">
-                <a:schemeClr val="accent1">
-                  <a:lumMod val="90000"/>
-                </a:schemeClr>
-              </a:gs>
-              <a:gs pos="25000">
-                <a:schemeClr val="accent1">
-                  <a:lumMod val="90000"/>
-                </a:schemeClr>
-              </a:gs>
-              <a:gs pos="94000">
-                <a:schemeClr val="bg2">
-                  <a:lumMod val="25000"/>
-                </a:schemeClr>
-              </a:gs>
-              <a:gs pos="100000">
-                <a:schemeClr val="bg2">
-                  <a:lumMod val="25000"/>
-                </a:schemeClr>
-              </a:gs>
-            </a:gsLst>
-            <a:lin ang="4200000" scaled="0"/>
-          </a:gradFill>
-          <a:ln>
-            <a:noFill/>
-          </a:ln>
-        </p:spPr>
-        <p:style>
-          <a:lnRef idx="2">
-            <a:schemeClr val="accent1">
-              <a:shade val="50000"/>
-            </a:schemeClr>
-          </a:lnRef>
-          <a:fillRef idx="1">
-            <a:schemeClr val="accent1"/>
-          </a:fillRef>
-          <a:effectRef idx="0">
-            <a:schemeClr val="accent1"/>
-          </a:effectRef>
-          <a:fontRef idx="minor">
-            <a:schemeClr val="lt1"/>
-          </a:fontRef>
-        </p:style>
-        <p:txBody>
-          <a:bodyPr rtlCol="0" anchor="ctr"/>
-          <a:lstStyle/>
-          <a:p>
-            <a:pPr algn="ctr"/>
-            <a:endParaRPr lang="en-US"/>
-          </a:p>
-        </p:txBody>
-      </p:sp>
-      <p:pic>
-        <p:nvPicPr>
-          <p:cNvPr id="19" name="Picture 18">
-            <a:extLst>
-              <a:ext uri="{FF2B5EF4-FFF2-40B4-BE49-F238E27FC236}">
-                <a16:creationId xmlns:a16="http://schemas.microsoft.com/office/drawing/2014/main" id="{3AA16612-ACD2-4A16-8F2B-4514FD6BF28F}"/>
-              </a:ext>
-              <a:ext uri="{C183D7F6-B498-43B3-948B-1728B52AA6E4}">
-                <adec:decorative xmlns:adec="http://schemas.microsoft.com/office/drawing/2017/decorative" val="1"/>
-              </a:ext>
-            </a:extLst>
-          </p:cNvPr>
-          <p:cNvPicPr>
-            <a:picLocks noGrp="1" noRot="1" noChangeAspect="1" noMove="1" noResize="1" noEditPoints="1" noAdjustHandles="1" noChangeArrowheads="1" noChangeShapeType="1" noCrop="1"/>
-          </p:cNvPicPr>
-          <p:nvPr>
-            <p:extLst>
-              <p:ext uri="{386F3935-93C4-4BCD-93E2-E3B085C9AB24}">
-                <p16:designElem xmlns:p16="http://schemas.microsoft.com/office/powerpoint/2015/main" val="1"/>
-              </p:ext>
-            </p:extLst>
-          </p:nvPr>
-        </p:nvPicPr>
-        <p:blipFill>
-          <a:blip r:embed="rId2">
-            <a:extLst>
-              <a:ext uri="{28A0092B-C50C-407E-A947-70E740481C1C}">
-                <a14:useLocalDpi xmlns:a14="http://schemas.microsoft.com/office/drawing/2010/main" val="0"/>
-              </a:ext>
-            </a:extLst>
-          </a:blip>
-          <a:stretch>
-            <a:fillRect/>
-          </a:stretch>
-        </p:blipFill>
-        <p:spPr>
-          <a:xfrm>
-            <a:off x="0" y="0"/>
-            <a:ext cx="12192000" cy="6858000"/>
-          </a:xfrm>
-          <a:prstGeom prst="rect">
-            <a:avLst/>
-          </a:prstGeom>
-        </p:spPr>
-      </p:pic>
-      <p:sp>
-        <p:nvSpPr>
-          <p:cNvPr id="2" name="Titre 1">
-            <a:extLst>
-              <a:ext uri="{FF2B5EF4-FFF2-40B4-BE49-F238E27FC236}">
-                <a16:creationId xmlns:a16="http://schemas.microsoft.com/office/drawing/2014/main" id="{0E8399BF-7572-4A1E-B687-4E11FBEA28D2}"/>
-              </a:ext>
-            </a:extLst>
-          </p:cNvPr>
-          <p:cNvSpPr>
-            <a:spLocks noGrp="1"/>
-          </p:cNvSpPr>
-          <p:nvPr>
-            <p:ph type="title"/>
-          </p:nvPr>
-        </p:nvSpPr>
-        <p:spPr>
-          <a:xfrm>
-            <a:off x="1179226" y="826680"/>
-            <a:ext cx="9833548" cy="1325563"/>
-          </a:xfrm>
-        </p:spPr>
-        <p:txBody>
-          <a:bodyPr>
-            <a:normAutofit/>
-          </a:bodyPr>
-          <a:lstStyle/>
-          <a:p>
-            <a:pPr algn="ctr"/>
-            <a:r>
-              <a:rPr lang="en-GB" sz="4000" dirty="0">
-                <a:solidFill>
-                  <a:srgbClr val="FFFFFF"/>
-                </a:solidFill>
-              </a:rPr>
-              <a:t>Introduction /Business Problem</a:t>
-            </a:r>
-          </a:p>
-        </p:txBody>
-      </p:sp>
-      <p:sp>
-        <p:nvSpPr>
-          <p:cNvPr id="3" name="Espace réservé du contenu 2">
-            <a:extLst>
-              <a:ext uri="{FF2B5EF4-FFF2-40B4-BE49-F238E27FC236}">
-                <a16:creationId xmlns:a16="http://schemas.microsoft.com/office/drawing/2014/main" id="{D51967D2-52AF-49AA-BF0E-E7A9A786EA47}"/>
-              </a:ext>
-            </a:extLst>
-          </p:cNvPr>
-          <p:cNvSpPr>
-            <a:spLocks noGrp="1"/>
-          </p:cNvSpPr>
-          <p:nvPr>
-            <p:ph idx="1"/>
-          </p:nvPr>
-        </p:nvSpPr>
-        <p:spPr>
-          <a:xfrm>
-            <a:off x="1179074" y="2882213"/>
-            <a:ext cx="9833548" cy="410696"/>
-          </a:xfrm>
-        </p:spPr>
-        <p:txBody>
-          <a:bodyPr>
-            <a:normAutofit fontScale="92500" lnSpcReduction="20000"/>
-          </a:bodyPr>
-          <a:lstStyle/>
-          <a:p>
-            <a:pPr marL="0" indent="0">
-              <a:buNone/>
-            </a:pPr>
-            <a:r>
               <a:rPr lang="en-US" b="1" dirty="0">
                 <a:solidFill>
                   <a:srgbClr val="3A558A"/>
@@ -9913,11 +8357,11 @@
           <a:p>
             <a:r>
               <a:rPr lang="en-GB" sz="2800" b="1" dirty="0"/>
-              <a:t>Clustered </a:t>
+              <a:t>Clustering </a:t>
             </a:r>
             <a:r>
               <a:rPr lang="en-US" dirty="0"/>
-              <a:t>Bordeaux neighborhoods based on some preselected features to provide a decisional tool for both new commers &amp; new companies </a:t>
+              <a:t>Bordeaux neighborhoods based on some preselected features to provide a decision tool for both newcomers &amp; new companies </a:t>
             </a:r>
             <a:endParaRPr lang="en-US" sz="2800" dirty="0"/>
           </a:p>
@@ -10032,7 +8476,7 @@
         </p:blipFill>
         <p:spPr>
           <a:xfrm>
-            <a:off x="1556598" y="5332466"/>
+            <a:off x="1556598" y="5413875"/>
             <a:ext cx="914400" cy="914400"/>
           </a:xfrm>
           <a:prstGeom prst="rect">
@@ -11137,7 +9581,7 @@
           <p:nvPr>
             <p:extLst>
               <p:ext uri="{D42A27DB-BD31-4B8C-83A1-F6EECF244321}">
-                <p14:modId xmlns:p14="http://schemas.microsoft.com/office/powerpoint/2010/main" val="2209809303"/>
+                <p14:modId xmlns:p14="http://schemas.microsoft.com/office/powerpoint/2010/main" val="3071135587"/>
               </p:ext>
             </p:extLst>
           </p:nvPr>
@@ -11482,39 +9926,41 @@
         </p:nvSpPr>
         <p:spPr>
           <a:xfrm>
-            <a:off x="838048" y="2753935"/>
+            <a:off x="838048" y="2570714"/>
             <a:ext cx="10515600" cy="3750891"/>
           </a:xfrm>
         </p:spPr>
         <p:txBody>
-          <a:bodyPr/>
+          <a:bodyPr>
+            <a:normAutofit fontScale="92500" lnSpcReduction="20000"/>
+          </a:bodyPr>
           <a:lstStyle/>
           <a:p>
             <a:pPr marL="0" indent="0" algn="ctr">
               <a:buNone/>
             </a:pPr>
             <a:r>
-              <a:rPr lang="en-GB" sz="2400" u="sng"/>
+              <a:rPr lang="en-GB" sz="2400" u="sng" dirty="0"/>
               <a:t>Dataset of the last 5 years</a:t>
             </a:r>
             <a:r>
-              <a:rPr lang="en-GB" sz="2400"/>
+              <a:rPr lang="en-GB" sz="2400" dirty="0"/>
               <a:t> </a:t>
             </a:r>
           </a:p>
           <a:p>
-            <a:endParaRPr lang="en-GB" sz="2400"/>
+            <a:endParaRPr lang="en-GB" sz="2400" dirty="0"/>
           </a:p>
           <a:p>
             <a:pPr marL="0" indent="0" algn="ctr">
               <a:buNone/>
             </a:pPr>
             <a:r>
-              <a:rPr lang="en-GB" sz="2400"/>
+              <a:rPr lang="en-GB" sz="2400" dirty="0"/>
               <a:t>https://api.cquest.org/dvf?lat={(</a:t>
             </a:r>
             <a:r>
-              <a:rPr lang="en-GB" sz="2400" b="1">
+              <a:rPr lang="en-GB" sz="2400" b="1" dirty="0">
                 <a:solidFill>
                   <a:schemeClr val="accent1"/>
                 </a:solidFill>
@@ -11522,11 +9968,11 @@
               <a:t>latitude</a:t>
             </a:r>
             <a:r>
-              <a:rPr lang="en-GB" sz="2400"/>
+              <a:rPr lang="en-GB" sz="2400" dirty="0"/>
               <a:t>)}&amp;lon={ </a:t>
             </a:r>
             <a:r>
-              <a:rPr lang="en-GB" sz="2400" b="1">
+              <a:rPr lang="en-GB" sz="2400" b="1" dirty="0">
                 <a:solidFill>
                   <a:schemeClr val="accent1"/>
                 </a:solidFill>
@@ -11534,11 +9980,19 @@
               <a:t>longitude</a:t>
             </a:r>
             <a:r>
-              <a:rPr lang="en-GB" sz="2400"/>
-              <a:t>}&amp;dist={</a:t>
-            </a:r>
-            <a:r>
-              <a:rPr lang="en-GB" sz="2400" b="1">
+              <a:rPr lang="en-GB" sz="2400" dirty="0"/>
+              <a:t>}&amp;</a:t>
+            </a:r>
+            <a:r>
+              <a:rPr lang="en-GB" sz="2400" dirty="0" err="1"/>
+              <a:t>dist</a:t>
+            </a:r>
+            <a:r>
+              <a:rPr lang="en-GB" sz="2400" dirty="0"/>
+              <a:t>={</a:t>
+            </a:r>
+            <a:r>
+              <a:rPr lang="en-GB" sz="2400" b="1" dirty="0">
                 <a:solidFill>
                   <a:schemeClr val="accent1"/>
                 </a:solidFill>
@@ -11546,7 +10000,7 @@
               <a:t>RADIUS</a:t>
             </a:r>
             <a:r>
-              <a:rPr lang="en-GB" sz="2400"/>
+              <a:rPr lang="en-GB" sz="2400" dirty="0"/>
               <a:t>}</a:t>
             </a:r>
           </a:p>
@@ -11554,30 +10008,30 @@
             <a:pPr marL="0" indent="0">
               <a:buNone/>
             </a:pPr>
-            <a:endParaRPr lang="en-GB" sz="2400"/>
+            <a:endParaRPr lang="en-GB" sz="2400" dirty="0"/>
           </a:p>
           <a:p>
             <a:pPr marL="0" indent="0">
               <a:buNone/>
             </a:pPr>
             <a:r>
-              <a:rPr lang="en-GB" sz="2400"/>
+              <a:rPr lang="en-GB" sz="2400" dirty="0"/>
               <a:t>Main data information returned in json format : </a:t>
             </a:r>
           </a:p>
           <a:p>
-            <a:endParaRPr lang="en-GB" sz="2400"/>
+            <a:endParaRPr lang="en-GB" sz="2400" dirty="0"/>
           </a:p>
           <a:p>
             <a:pPr marL="0" indent="0">
               <a:buNone/>
             </a:pPr>
             <a:r>
-              <a:rPr lang="en-GB" sz="2400"/>
+              <a:rPr lang="en-GB" sz="2400" dirty="0"/>
               <a:t>The value do not take into </a:t>
             </a:r>
             <a:r>
-              <a:rPr lang="en-GB" sz="2400" b="1" u="sng"/>
+              <a:rPr lang="en-GB" sz="2400" b="1" u="sng" dirty="0"/>
               <a:t>account real estates </a:t>
             </a:r>
           </a:p>
@@ -11586,7 +10040,7 @@
               <a:buNone/>
             </a:pPr>
             <a:r>
-              <a:rPr lang="en-GB" sz="2400" b="1" u="sng"/>
+              <a:rPr lang="en-GB" sz="2400" b="1" u="sng" dirty="0"/>
               <a:t>agencies fees &amp; Notary fees </a:t>
             </a:r>
           </a:p>
@@ -11594,7 +10048,22 @@
             <a:pPr marL="0" indent="0">
               <a:buNone/>
             </a:pPr>
-            <a:endParaRPr lang="en-GB" sz="2400"/>
+            <a:endParaRPr lang="en-GB" sz="2400" b="1" u="sng" dirty="0"/>
+          </a:p>
+          <a:p>
+            <a:pPr marL="0" indent="0">
+              <a:buNone/>
+            </a:pPr>
+            <a:r>
+              <a:rPr lang="en-GB" sz="2400" b="1" u="sng" dirty="0"/>
+              <a:t>Average price per square meter added</a:t>
+            </a:r>
+          </a:p>
+          <a:p>
+            <a:pPr marL="0" indent="0">
+              <a:buNone/>
+            </a:pPr>
+            <a:endParaRPr lang="en-GB" sz="2400" dirty="0"/>
           </a:p>
           <a:p>
             <a:pPr marL="0" indent="0">
@@ -11626,8 +10095,8 @@
         </p:blipFill>
         <p:spPr>
           <a:xfrm>
-            <a:off x="6908615" y="4446160"/>
-            <a:ext cx="5283081" cy="2058666"/>
+            <a:off x="6553014" y="3814268"/>
+            <a:ext cx="6020199" cy="2345900"/>
           </a:xfrm>
           <a:prstGeom prst="rect">
             <a:avLst/>

</xml_diff>